<commit_message>
Changed heading in healthcare pipeline schematics.
</commit_message>
<xml_diff>
--- a/images/pipeline_diagram.pptx
+++ b/images/pipeline_diagram.pptx
@@ -12,6 +12,7 @@
     <p:sldId id="260" r:id="rId6"/>
     <p:sldId id="261" r:id="rId7"/>
     <p:sldId id="262" r:id="rId8"/>
+    <p:sldId id="263" r:id="rId9"/>
   </p:sldIdLst>
   <p:sldSz cx="12192000" cy="6858000"/>
   <p:notesSz cx="6858000" cy="9144000"/>
@@ -265,7 +266,7 @@
           <a:p>
             <a:fld id="{6E608A49-E0F0-443F-8507-C54BC64CD2AC}" type="datetimeFigureOut">
               <a:rPr lang="en-US" smtClean="0"/>
-              <a:t>5/21/2019</a:t>
+              <a:t>6/17/19</a:t>
             </a:fld>
             <a:endParaRPr lang="en-US"/>
           </a:p>
@@ -463,7 +464,7 @@
           <a:p>
             <a:fld id="{6E608A49-E0F0-443F-8507-C54BC64CD2AC}" type="datetimeFigureOut">
               <a:rPr lang="en-US" smtClean="0"/>
-              <a:t>5/21/2019</a:t>
+              <a:t>6/17/19</a:t>
             </a:fld>
             <a:endParaRPr lang="en-US"/>
           </a:p>
@@ -671,7 +672,7 @@
           <a:p>
             <a:fld id="{6E608A49-E0F0-443F-8507-C54BC64CD2AC}" type="datetimeFigureOut">
               <a:rPr lang="en-US" smtClean="0"/>
-              <a:t>5/21/2019</a:t>
+              <a:t>6/17/19</a:t>
             </a:fld>
             <a:endParaRPr lang="en-US"/>
           </a:p>
@@ -869,7 +870,7 @@
           <a:p>
             <a:fld id="{6E608A49-E0F0-443F-8507-C54BC64CD2AC}" type="datetimeFigureOut">
               <a:rPr lang="en-US" smtClean="0"/>
-              <a:t>5/21/2019</a:t>
+              <a:t>6/17/19</a:t>
             </a:fld>
             <a:endParaRPr lang="en-US"/>
           </a:p>
@@ -1144,7 +1145,7 @@
           <a:p>
             <a:fld id="{6E608A49-E0F0-443F-8507-C54BC64CD2AC}" type="datetimeFigureOut">
               <a:rPr lang="en-US" smtClean="0"/>
-              <a:t>5/21/2019</a:t>
+              <a:t>6/17/19</a:t>
             </a:fld>
             <a:endParaRPr lang="en-US"/>
           </a:p>
@@ -1409,7 +1410,7 @@
           <a:p>
             <a:fld id="{6E608A49-E0F0-443F-8507-C54BC64CD2AC}" type="datetimeFigureOut">
               <a:rPr lang="en-US" smtClean="0"/>
-              <a:t>5/21/2019</a:t>
+              <a:t>6/17/19</a:t>
             </a:fld>
             <a:endParaRPr lang="en-US"/>
           </a:p>
@@ -1821,7 +1822,7 @@
           <a:p>
             <a:fld id="{6E608A49-E0F0-443F-8507-C54BC64CD2AC}" type="datetimeFigureOut">
               <a:rPr lang="en-US" smtClean="0"/>
-              <a:t>5/21/2019</a:t>
+              <a:t>6/17/19</a:t>
             </a:fld>
             <a:endParaRPr lang="en-US"/>
           </a:p>
@@ -1962,7 +1963,7 @@
           <a:p>
             <a:fld id="{6E608A49-E0F0-443F-8507-C54BC64CD2AC}" type="datetimeFigureOut">
               <a:rPr lang="en-US" smtClean="0"/>
-              <a:t>5/21/2019</a:t>
+              <a:t>6/17/19</a:t>
             </a:fld>
             <a:endParaRPr lang="en-US"/>
           </a:p>
@@ -2075,7 +2076,7 @@
           <a:p>
             <a:fld id="{6E608A49-E0F0-443F-8507-C54BC64CD2AC}" type="datetimeFigureOut">
               <a:rPr lang="en-US" smtClean="0"/>
-              <a:t>5/21/2019</a:t>
+              <a:t>6/17/19</a:t>
             </a:fld>
             <a:endParaRPr lang="en-US"/>
           </a:p>
@@ -2386,7 +2387,7 @@
           <a:p>
             <a:fld id="{6E608A49-E0F0-443F-8507-C54BC64CD2AC}" type="datetimeFigureOut">
               <a:rPr lang="en-US" smtClean="0"/>
-              <a:t>5/21/2019</a:t>
+              <a:t>6/17/19</a:t>
             </a:fld>
             <a:endParaRPr lang="en-US"/>
           </a:p>
@@ -2674,7 +2675,7 @@
           <a:p>
             <a:fld id="{6E608A49-E0F0-443F-8507-C54BC64CD2AC}" type="datetimeFigureOut">
               <a:rPr lang="en-US" smtClean="0"/>
-              <a:t>5/21/2019</a:t>
+              <a:t>6/17/19</a:t>
             </a:fld>
             <a:endParaRPr lang="en-US"/>
           </a:p>
@@ -2915,7 +2916,7 @@
           <a:p>
             <a:fld id="{6E608A49-E0F0-443F-8507-C54BC64CD2AC}" type="datetimeFigureOut">
               <a:rPr lang="en-US" smtClean="0"/>
-              <a:t>5/21/2019</a:t>
+              <a:t>6/17/19</a:t>
             </a:fld>
             <a:endParaRPr lang="en-US"/>
           </a:p>
@@ -10387,6 +10388,1312 @@
 </p:sld>
 </file>
 
+<file path=ppt/slides/slide8.xml><?xml version="1.0" encoding="utf-8"?>
+<p:sld xmlns:a="http://schemas.openxmlformats.org/drawingml/2006/main" xmlns:r="http://schemas.openxmlformats.org/officeDocument/2006/relationships" xmlns:p="http://schemas.openxmlformats.org/presentationml/2006/main">
+  <p:cSld>
+    <p:spTree>
+      <p:nvGrpSpPr>
+        <p:cNvPr id="1" name=""/>
+        <p:cNvGrpSpPr/>
+        <p:nvPr/>
+      </p:nvGrpSpPr>
+      <p:grpSpPr>
+        <a:xfrm>
+          <a:off x="0" y="0"/>
+          <a:ext cx="0" cy="0"/>
+          <a:chOff x="0" y="0"/>
+          <a:chExt cx="0" cy="0"/>
+        </a:xfrm>
+      </p:grpSpPr>
+      <p:sp>
+        <p:nvSpPr>
+          <p:cNvPr id="4" name="Arrow: Chevron 3">
+            <a:extLst>
+              <a:ext uri="{FF2B5EF4-FFF2-40B4-BE49-F238E27FC236}">
+                <a16:creationId xmlns:a16="http://schemas.microsoft.com/office/drawing/2014/main" id="{3C386B56-5042-4FC8-BFE7-1A5F15D0BA5B}"/>
+              </a:ext>
+            </a:extLst>
+          </p:cNvPr>
+          <p:cNvSpPr/>
+          <p:nvPr/>
+        </p:nvSpPr>
+        <p:spPr>
+          <a:xfrm rot="5400000">
+            <a:off x="1684066" y="144385"/>
+            <a:ext cx="740532" cy="1435608"/>
+          </a:xfrm>
+          <a:prstGeom prst="chevron">
+            <a:avLst>
+              <a:gd name="adj" fmla="val 24275"/>
+            </a:avLst>
+          </a:prstGeom>
+          <a:solidFill>
+            <a:schemeClr val="accent6">
+              <a:lumMod val="60000"/>
+              <a:lumOff val="40000"/>
+            </a:schemeClr>
+          </a:solidFill>
+          <a:ln>
+            <a:solidFill>
+              <a:schemeClr val="accent6">
+                <a:lumMod val="60000"/>
+                <a:lumOff val="40000"/>
+              </a:schemeClr>
+            </a:solidFill>
+          </a:ln>
+        </p:spPr>
+        <p:style>
+          <a:lnRef idx="2">
+            <a:schemeClr val="accent1">
+              <a:shade val="50000"/>
+            </a:schemeClr>
+          </a:lnRef>
+          <a:fillRef idx="1">
+            <a:schemeClr val="accent1"/>
+          </a:fillRef>
+          <a:effectRef idx="0">
+            <a:schemeClr val="accent1"/>
+          </a:effectRef>
+          <a:fontRef idx="minor">
+            <a:schemeClr val="lt1"/>
+          </a:fontRef>
+        </p:style>
+        <p:txBody>
+          <a:bodyPr vert="vert270" rtlCol="0" anchor="ctr"/>
+          <a:lstStyle/>
+          <a:p>
+            <a:pPr algn="ctr"/>
+            <a:r>
+              <a:rPr lang="en-US" sz="1200" b="1" dirty="0">
+                <a:solidFill>
+                  <a:schemeClr val="tx1"/>
+                </a:solidFill>
+                <a:latin typeface="Times New Roman" panose="02020603050405020304" pitchFamily="18" charset="0"/>
+                <a:cs typeface="Times New Roman" panose="02020603050405020304" pitchFamily="18" charset="0"/>
+              </a:rPr>
+              <a:t>Pathway Discovery</a:t>
+            </a:r>
+          </a:p>
+        </p:txBody>
+      </p:sp>
+      <p:sp>
+        <p:nvSpPr>
+          <p:cNvPr id="8" name="Arrow: Chevron 7">
+            <a:extLst>
+              <a:ext uri="{FF2B5EF4-FFF2-40B4-BE49-F238E27FC236}">
+                <a16:creationId xmlns:a16="http://schemas.microsoft.com/office/drawing/2014/main" id="{D12F90B4-0BD8-4D12-9992-E15C37477304}"/>
+              </a:ext>
+            </a:extLst>
+          </p:cNvPr>
+          <p:cNvSpPr/>
+          <p:nvPr/>
+        </p:nvSpPr>
+        <p:spPr>
+          <a:xfrm rot="5400000">
+            <a:off x="1684113" y="1036303"/>
+            <a:ext cx="740532" cy="1435514"/>
+          </a:xfrm>
+          <a:prstGeom prst="chevron">
+            <a:avLst>
+              <a:gd name="adj" fmla="val 24275"/>
+            </a:avLst>
+          </a:prstGeom>
+          <a:solidFill>
+            <a:schemeClr val="accent6">
+              <a:lumMod val="60000"/>
+              <a:lumOff val="40000"/>
+            </a:schemeClr>
+          </a:solidFill>
+          <a:ln>
+            <a:solidFill>
+              <a:schemeClr val="accent6">
+                <a:lumMod val="60000"/>
+                <a:lumOff val="40000"/>
+              </a:schemeClr>
+            </a:solidFill>
+          </a:ln>
+        </p:spPr>
+        <p:style>
+          <a:lnRef idx="2">
+            <a:schemeClr val="accent1">
+              <a:shade val="50000"/>
+            </a:schemeClr>
+          </a:lnRef>
+          <a:fillRef idx="1">
+            <a:schemeClr val="accent1"/>
+          </a:fillRef>
+          <a:effectRef idx="0">
+            <a:schemeClr val="accent1"/>
+          </a:effectRef>
+          <a:fontRef idx="minor">
+            <a:schemeClr val="lt1"/>
+          </a:fontRef>
+        </p:style>
+        <p:txBody>
+          <a:bodyPr vert="vert270" rtlCol="0" anchor="ctr"/>
+          <a:lstStyle/>
+          <a:p>
+            <a:pPr algn="ctr"/>
+            <a:r>
+              <a:rPr lang="en-US" sz="1200" b="1" dirty="0">
+                <a:solidFill>
+                  <a:schemeClr val="tx1"/>
+                </a:solidFill>
+                <a:latin typeface="Times New Roman" panose="02020603050405020304" pitchFamily="18" charset="0"/>
+                <a:cs typeface="Times New Roman" panose="02020603050405020304" pitchFamily="18" charset="0"/>
+              </a:rPr>
+              <a:t>Pathway Discovery</a:t>
+            </a:r>
+          </a:p>
+        </p:txBody>
+      </p:sp>
+      <p:sp>
+        <p:nvSpPr>
+          <p:cNvPr id="9" name="Rectangle 8">
+            <a:extLst>
+              <a:ext uri="{FF2B5EF4-FFF2-40B4-BE49-F238E27FC236}">
+                <a16:creationId xmlns:a16="http://schemas.microsoft.com/office/drawing/2014/main" id="{6885163B-7BFD-4F53-BEAA-993F9835100F}"/>
+              </a:ext>
+            </a:extLst>
+          </p:cNvPr>
+          <p:cNvSpPr/>
+          <p:nvPr/>
+        </p:nvSpPr>
+        <p:spPr>
+          <a:xfrm>
+            <a:off x="2772135" y="491923"/>
+            <a:ext cx="6228741" cy="565600"/>
+          </a:xfrm>
+          <a:prstGeom prst="rect">
+            <a:avLst/>
+          </a:prstGeom>
+          <a:solidFill>
+            <a:schemeClr val="bg1">
+              <a:lumMod val="85000"/>
+            </a:schemeClr>
+          </a:solidFill>
+          <a:ln>
+            <a:solidFill>
+              <a:schemeClr val="bg1">
+                <a:lumMod val="85000"/>
+              </a:schemeClr>
+            </a:solidFill>
+          </a:ln>
+        </p:spPr>
+        <p:style>
+          <a:lnRef idx="2">
+            <a:schemeClr val="accent1">
+              <a:shade val="50000"/>
+            </a:schemeClr>
+          </a:lnRef>
+          <a:fillRef idx="1">
+            <a:schemeClr val="accent1"/>
+          </a:fillRef>
+          <a:effectRef idx="0">
+            <a:schemeClr val="accent1"/>
+          </a:effectRef>
+          <a:fontRef idx="minor">
+            <a:schemeClr val="lt1"/>
+          </a:fontRef>
+        </p:style>
+        <p:txBody>
+          <a:bodyPr rot="0" spcFirstLastPara="0" vertOverflow="overflow" horzOverflow="overflow" vert="horz" wrap="square" lIns="91440" tIns="45720" rIns="91440" bIns="45720" numCol="1" spcCol="0" rtlCol="0" fromWordArt="0" anchor="ctr" anchorCtr="0" forceAA="0" compatLnSpc="1">
+            <a:prstTxWarp prst="textNoShape">
+              <a:avLst/>
+            </a:prstTxWarp>
+            <a:noAutofit/>
+          </a:bodyPr>
+          <a:lstStyle/>
+          <a:p>
+            <a:r>
+              <a:rPr lang="en-US" sz="1200" b="1" dirty="0">
+                <a:solidFill>
+                  <a:schemeClr val="tx1"/>
+                </a:solidFill>
+                <a:latin typeface="Times New Roman" panose="02020603050405020304" pitchFamily="18" charset="0"/>
+                <a:cs typeface="Times New Roman" panose="02020603050405020304" pitchFamily="18" charset="0"/>
+              </a:rPr>
+              <a:t>Clinical Data Processing</a:t>
+            </a:r>
+          </a:p>
+          <a:p>
+            <a:pPr marL="171450" indent="-171450">
+              <a:buFont typeface="Arial" panose="020B0604020202020204" pitchFamily="34" charset="0"/>
+              <a:buChar char="•"/>
+            </a:pPr>
+            <a:r>
+              <a:rPr lang="en-US" sz="1200" dirty="0">
+                <a:solidFill>
+                  <a:schemeClr val="tx1"/>
+                </a:solidFill>
+                <a:latin typeface="Times New Roman" panose="02020603050405020304" pitchFamily="18" charset="0"/>
+                <a:cs typeface="Times New Roman" panose="02020603050405020304" pitchFamily="18" charset="0"/>
+              </a:rPr>
+              <a:t>Identify and condense repetitive activity patterns</a:t>
+            </a:r>
+          </a:p>
+          <a:p>
+            <a:pPr marL="171450" indent="-171450">
+              <a:buFont typeface="Arial" panose="020B0604020202020204" pitchFamily="34" charset="0"/>
+              <a:buChar char="•"/>
+            </a:pPr>
+            <a:r>
+              <a:rPr lang="en-US" sz="1200" dirty="0">
+                <a:solidFill>
+                  <a:schemeClr val="tx1"/>
+                </a:solidFill>
+                <a:latin typeface="Times New Roman" panose="02020603050405020304" pitchFamily="18" charset="0"/>
+                <a:cs typeface="Times New Roman" panose="02020603050405020304" pitchFamily="18" charset="0"/>
+              </a:rPr>
+              <a:t>Cluster clinical activities by departments</a:t>
+            </a:r>
+          </a:p>
+        </p:txBody>
+      </p:sp>
+      <p:sp>
+        <p:nvSpPr>
+          <p:cNvPr id="10" name="Rectangle 9">
+            <a:extLst>
+              <a:ext uri="{FF2B5EF4-FFF2-40B4-BE49-F238E27FC236}">
+                <a16:creationId xmlns:a16="http://schemas.microsoft.com/office/drawing/2014/main" id="{9B825A72-9F44-4778-925B-BFF2AE985CA0}"/>
+              </a:ext>
+            </a:extLst>
+          </p:cNvPr>
+          <p:cNvSpPr/>
+          <p:nvPr/>
+        </p:nvSpPr>
+        <p:spPr>
+          <a:xfrm>
+            <a:off x="2772136" y="1383794"/>
+            <a:ext cx="6228742" cy="565600"/>
+          </a:xfrm>
+          <a:prstGeom prst="rect">
+            <a:avLst/>
+          </a:prstGeom>
+          <a:solidFill>
+            <a:schemeClr val="bg1">
+              <a:lumMod val="85000"/>
+            </a:schemeClr>
+          </a:solidFill>
+          <a:ln>
+            <a:solidFill>
+              <a:schemeClr val="bg1">
+                <a:lumMod val="85000"/>
+              </a:schemeClr>
+            </a:solidFill>
+          </a:ln>
+        </p:spPr>
+        <p:style>
+          <a:lnRef idx="2">
+            <a:schemeClr val="accent1">
+              <a:shade val="50000"/>
+            </a:schemeClr>
+          </a:lnRef>
+          <a:fillRef idx="1">
+            <a:schemeClr val="accent1"/>
+          </a:fillRef>
+          <a:effectRef idx="0">
+            <a:schemeClr val="accent1"/>
+          </a:effectRef>
+          <a:fontRef idx="minor">
+            <a:schemeClr val="lt1"/>
+          </a:fontRef>
+        </p:style>
+        <p:txBody>
+          <a:bodyPr rot="0" spcFirstLastPara="0" vertOverflow="overflow" horzOverflow="overflow" vert="horz" wrap="square" lIns="91440" tIns="45720" rIns="91440" bIns="45720" numCol="1" spcCol="0" rtlCol="0" fromWordArt="0" anchor="ctr" anchorCtr="0" forceAA="0" compatLnSpc="1">
+            <a:prstTxWarp prst="textNoShape">
+              <a:avLst/>
+            </a:prstTxWarp>
+            <a:noAutofit/>
+          </a:bodyPr>
+          <a:lstStyle/>
+          <a:p>
+            <a:r>
+              <a:rPr lang="en-US" sz="1200" b="1" dirty="0">
+                <a:solidFill>
+                  <a:schemeClr val="tx1"/>
+                </a:solidFill>
+                <a:latin typeface="Times New Roman" panose="02020603050405020304" pitchFamily="18" charset="0"/>
+                <a:cs typeface="Times New Roman" panose="02020603050405020304" pitchFamily="18" charset="0"/>
+              </a:rPr>
+              <a:t>Pathway Visualization</a:t>
+            </a:r>
+          </a:p>
+          <a:p>
+            <a:pPr marL="171450" indent="-171450">
+              <a:buFont typeface="Arial" panose="020B0604020202020204" pitchFamily="34" charset="0"/>
+              <a:buChar char="•"/>
+            </a:pPr>
+            <a:r>
+              <a:rPr lang="en-US" sz="1200" dirty="0">
+                <a:solidFill>
+                  <a:schemeClr val="tx1"/>
+                </a:solidFill>
+                <a:latin typeface="Times New Roman" panose="02020603050405020304" pitchFamily="18" charset="0"/>
+                <a:cs typeface="Times New Roman" panose="02020603050405020304" pitchFamily="18" charset="0"/>
+              </a:rPr>
+              <a:t>Import processed data into ProM</a:t>
+            </a:r>
+          </a:p>
+          <a:p>
+            <a:pPr marL="171450" indent="-171450">
+              <a:buFont typeface="Arial" panose="020B0604020202020204" pitchFamily="34" charset="0"/>
+              <a:buChar char="•"/>
+            </a:pPr>
+            <a:r>
+              <a:rPr lang="en-US" sz="1200" dirty="0">
+                <a:solidFill>
+                  <a:schemeClr val="tx1"/>
+                </a:solidFill>
+                <a:latin typeface="Times New Roman" panose="02020603050405020304" pitchFamily="18" charset="0"/>
+                <a:cs typeface="Times New Roman" panose="02020603050405020304" pitchFamily="18" charset="0"/>
+              </a:rPr>
+              <a:t>Use ProM functions to discover clean healthcare pathway</a:t>
+            </a:r>
+          </a:p>
+        </p:txBody>
+      </p:sp>
+      <p:grpSp>
+        <p:nvGrpSpPr>
+          <p:cNvPr id="2" name="Group 1">
+            <a:extLst>
+              <a:ext uri="{FF2B5EF4-FFF2-40B4-BE49-F238E27FC236}">
+                <a16:creationId xmlns:a16="http://schemas.microsoft.com/office/drawing/2014/main" id="{34AD6C34-30DD-4D71-BF09-E29ACDFACF28}"/>
+              </a:ext>
+            </a:extLst>
+          </p:cNvPr>
+          <p:cNvGrpSpPr/>
+          <p:nvPr/>
+        </p:nvGrpSpPr>
+        <p:grpSpPr>
+          <a:xfrm>
+            <a:off x="1336622" y="2275665"/>
+            <a:ext cx="7664256" cy="740532"/>
+            <a:chOff x="1336622" y="2275665"/>
+            <a:chExt cx="7664256" cy="740532"/>
+          </a:xfrm>
+        </p:grpSpPr>
+        <p:sp>
+          <p:nvSpPr>
+            <p:cNvPr id="6" name="Arrow: Chevron 5">
+              <a:extLst>
+                <a:ext uri="{FF2B5EF4-FFF2-40B4-BE49-F238E27FC236}">
+                  <a16:creationId xmlns:a16="http://schemas.microsoft.com/office/drawing/2014/main" id="{A8142872-3756-4981-A875-5A0D2C4362D5}"/>
+                </a:ext>
+              </a:extLst>
+            </p:cNvPr>
+            <p:cNvSpPr/>
+            <p:nvPr/>
+          </p:nvSpPr>
+          <p:spPr>
+            <a:xfrm rot="5400000">
+              <a:off x="1684113" y="1928174"/>
+              <a:ext cx="740532" cy="1435514"/>
+            </a:xfrm>
+            <a:prstGeom prst="chevron">
+              <a:avLst>
+                <a:gd name="adj" fmla="val 24275"/>
+              </a:avLst>
+            </a:prstGeom>
+            <a:solidFill>
+              <a:schemeClr val="accent5">
+                <a:lumMod val="60000"/>
+                <a:lumOff val="40000"/>
+              </a:schemeClr>
+            </a:solidFill>
+            <a:ln>
+              <a:solidFill>
+                <a:schemeClr val="accent1">
+                  <a:lumMod val="40000"/>
+                  <a:lumOff val="60000"/>
+                </a:schemeClr>
+              </a:solidFill>
+            </a:ln>
+          </p:spPr>
+          <p:style>
+            <a:lnRef idx="2">
+              <a:schemeClr val="accent1">
+                <a:shade val="50000"/>
+              </a:schemeClr>
+            </a:lnRef>
+            <a:fillRef idx="1">
+              <a:schemeClr val="accent1"/>
+            </a:fillRef>
+            <a:effectRef idx="0">
+              <a:schemeClr val="accent1"/>
+            </a:effectRef>
+            <a:fontRef idx="minor">
+              <a:schemeClr val="lt1"/>
+            </a:fontRef>
+          </p:style>
+          <p:txBody>
+            <a:bodyPr vert="vert270" rtlCol="0" anchor="ctr"/>
+            <a:lstStyle/>
+            <a:p>
+              <a:pPr algn="ctr"/>
+              <a:r>
+                <a:rPr lang="en-US" sz="1200" b="1" dirty="0">
+                  <a:solidFill>
+                    <a:schemeClr val="tx1"/>
+                  </a:solidFill>
+                  <a:latin typeface="Times New Roman" panose="02020603050405020304" pitchFamily="18" charset="0"/>
+                  <a:cs typeface="Times New Roman" panose="02020603050405020304" pitchFamily="18" charset="0"/>
+                </a:rPr>
+                <a:t>Conformance</a:t>
+              </a:r>
+            </a:p>
+          </p:txBody>
+        </p:sp>
+        <p:sp>
+          <p:nvSpPr>
+            <p:cNvPr id="11" name="Rectangle 10">
+              <a:extLst>
+                <a:ext uri="{FF2B5EF4-FFF2-40B4-BE49-F238E27FC236}">
+                  <a16:creationId xmlns:a16="http://schemas.microsoft.com/office/drawing/2014/main" id="{35323A90-87B0-4ABD-A0E2-F4366205CC94}"/>
+                </a:ext>
+              </a:extLst>
+            </p:cNvPr>
+            <p:cNvSpPr/>
+            <p:nvPr/>
+          </p:nvSpPr>
+          <p:spPr>
+            <a:xfrm>
+              <a:off x="2772136" y="2275665"/>
+              <a:ext cx="6228742" cy="565600"/>
+            </a:xfrm>
+            <a:prstGeom prst="rect">
+              <a:avLst/>
+            </a:prstGeom>
+            <a:solidFill>
+              <a:schemeClr val="bg1">
+                <a:lumMod val="85000"/>
+              </a:schemeClr>
+            </a:solidFill>
+            <a:ln>
+              <a:solidFill>
+                <a:schemeClr val="bg1">
+                  <a:lumMod val="85000"/>
+                </a:schemeClr>
+              </a:solidFill>
+            </a:ln>
+          </p:spPr>
+          <p:style>
+            <a:lnRef idx="2">
+              <a:schemeClr val="accent1">
+                <a:shade val="50000"/>
+              </a:schemeClr>
+            </a:lnRef>
+            <a:fillRef idx="1">
+              <a:schemeClr val="accent1"/>
+            </a:fillRef>
+            <a:effectRef idx="0">
+              <a:schemeClr val="accent1"/>
+            </a:effectRef>
+            <a:fontRef idx="minor">
+              <a:schemeClr val="lt1"/>
+            </a:fontRef>
+          </p:style>
+          <p:txBody>
+            <a:bodyPr rot="0" spcFirstLastPara="0" vertOverflow="overflow" horzOverflow="overflow" vert="horz" wrap="square" lIns="91440" tIns="45720" rIns="91440" bIns="45720" numCol="1" spcCol="0" rtlCol="0" fromWordArt="0" anchor="ctr" anchorCtr="0" forceAA="0" compatLnSpc="1">
+              <a:prstTxWarp prst="textNoShape">
+                <a:avLst/>
+              </a:prstTxWarp>
+              <a:noAutofit/>
+            </a:bodyPr>
+            <a:lstStyle/>
+            <a:p>
+              <a:r>
+                <a:rPr lang="en-US" sz="1200" b="1" dirty="0">
+                  <a:solidFill>
+                    <a:schemeClr val="tx1"/>
+                  </a:solidFill>
+                  <a:latin typeface="Times New Roman" panose="02020603050405020304" pitchFamily="18" charset="0"/>
+                  <a:cs typeface="Times New Roman" panose="02020603050405020304" pitchFamily="18" charset="0"/>
+                </a:rPr>
+                <a:t>Conformance Analysis</a:t>
+              </a:r>
+            </a:p>
+            <a:p>
+              <a:pPr marL="171450" indent="-171450">
+                <a:buFont typeface="Arial" panose="020B0604020202020204" pitchFamily="34" charset="0"/>
+                <a:buChar char="•"/>
+              </a:pPr>
+              <a:r>
+                <a:rPr lang="en-US" sz="1200" dirty="0">
+                  <a:solidFill>
+                    <a:schemeClr val="tx1"/>
+                  </a:solidFill>
+                  <a:latin typeface="Times New Roman" panose="02020603050405020304" pitchFamily="18" charset="0"/>
+                  <a:cs typeface="Times New Roman" panose="02020603050405020304" pitchFamily="18" charset="0"/>
+                </a:rPr>
+                <a:t>Identify patient deviations from healthcare pathway</a:t>
+              </a:r>
+            </a:p>
+            <a:p>
+              <a:pPr marL="171450" indent="-171450">
+                <a:buFont typeface="Arial" panose="020B0604020202020204" pitchFamily="34" charset="0"/>
+                <a:buChar char="•"/>
+              </a:pPr>
+              <a:r>
+                <a:rPr lang="en-US" sz="1200" dirty="0">
+                  <a:solidFill>
+                    <a:schemeClr val="tx1"/>
+                  </a:solidFill>
+                  <a:latin typeface="Times New Roman" panose="02020603050405020304" pitchFamily="18" charset="0"/>
+                  <a:cs typeface="Times New Roman" panose="02020603050405020304" pitchFamily="18" charset="0"/>
+                </a:rPr>
+                <a:t>Adjust healthcare pathway according to deviations</a:t>
+              </a:r>
+            </a:p>
+          </p:txBody>
+        </p:sp>
+      </p:grpSp>
+      <p:grpSp>
+        <p:nvGrpSpPr>
+          <p:cNvPr id="3" name="Group 2">
+            <a:extLst>
+              <a:ext uri="{FF2B5EF4-FFF2-40B4-BE49-F238E27FC236}">
+                <a16:creationId xmlns:a16="http://schemas.microsoft.com/office/drawing/2014/main" id="{A4CA2D6D-A876-4EE4-B74A-5880D9BBA98F}"/>
+              </a:ext>
+            </a:extLst>
+          </p:cNvPr>
+          <p:cNvGrpSpPr/>
+          <p:nvPr/>
+        </p:nvGrpSpPr>
+        <p:grpSpPr>
+          <a:xfrm>
+            <a:off x="1336622" y="3167536"/>
+            <a:ext cx="7664256" cy="740532"/>
+            <a:chOff x="1336622" y="3167536"/>
+            <a:chExt cx="7664256" cy="740532"/>
+          </a:xfrm>
+        </p:grpSpPr>
+        <p:sp>
+          <p:nvSpPr>
+            <p:cNvPr id="7" name="Arrow: Chevron 6">
+              <a:extLst>
+                <a:ext uri="{FF2B5EF4-FFF2-40B4-BE49-F238E27FC236}">
+                  <a16:creationId xmlns:a16="http://schemas.microsoft.com/office/drawing/2014/main" id="{19465C67-EF27-4B4A-9175-DBC54B846B22}"/>
+                </a:ext>
+              </a:extLst>
+            </p:cNvPr>
+            <p:cNvSpPr/>
+            <p:nvPr/>
+          </p:nvSpPr>
+          <p:spPr>
+            <a:xfrm rot="5400000">
+              <a:off x="1684113" y="2820045"/>
+              <a:ext cx="740532" cy="1435514"/>
+            </a:xfrm>
+            <a:prstGeom prst="chevron">
+              <a:avLst>
+                <a:gd name="adj" fmla="val 24275"/>
+              </a:avLst>
+            </a:prstGeom>
+            <a:solidFill>
+              <a:schemeClr val="accent4">
+                <a:lumMod val="40000"/>
+                <a:lumOff val="60000"/>
+              </a:schemeClr>
+            </a:solidFill>
+            <a:ln>
+              <a:solidFill>
+                <a:schemeClr val="accent4">
+                  <a:lumMod val="40000"/>
+                  <a:lumOff val="60000"/>
+                </a:schemeClr>
+              </a:solidFill>
+            </a:ln>
+          </p:spPr>
+          <p:style>
+            <a:lnRef idx="2">
+              <a:schemeClr val="accent1">
+                <a:shade val="50000"/>
+              </a:schemeClr>
+            </a:lnRef>
+            <a:fillRef idx="1">
+              <a:schemeClr val="accent1"/>
+            </a:fillRef>
+            <a:effectRef idx="0">
+              <a:schemeClr val="accent1"/>
+            </a:effectRef>
+            <a:fontRef idx="minor">
+              <a:schemeClr val="lt1"/>
+            </a:fontRef>
+          </p:style>
+          <p:txBody>
+            <a:bodyPr vert="vert270" rtlCol="0" anchor="ctr"/>
+            <a:lstStyle/>
+            <a:p>
+              <a:pPr algn="ctr"/>
+              <a:r>
+                <a:rPr lang="en-US" sz="1200" b="1" dirty="0">
+                  <a:solidFill>
+                    <a:schemeClr val="tx1"/>
+                  </a:solidFill>
+                  <a:latin typeface="Times New Roman" panose="02020603050405020304" pitchFamily="18" charset="0"/>
+                  <a:cs typeface="Times New Roman" panose="02020603050405020304" pitchFamily="18" charset="0"/>
+                </a:rPr>
+                <a:t>Data Enrichment</a:t>
+              </a:r>
+            </a:p>
+          </p:txBody>
+        </p:sp>
+        <p:sp>
+          <p:nvSpPr>
+            <p:cNvPr id="12" name="Rectangle 11">
+              <a:extLst>
+                <a:ext uri="{FF2B5EF4-FFF2-40B4-BE49-F238E27FC236}">
+                  <a16:creationId xmlns:a16="http://schemas.microsoft.com/office/drawing/2014/main" id="{EF3CB7C1-77EF-4DD9-BEF9-6286B8A73F64}"/>
+                </a:ext>
+              </a:extLst>
+            </p:cNvPr>
+            <p:cNvSpPr/>
+            <p:nvPr/>
+          </p:nvSpPr>
+          <p:spPr>
+            <a:xfrm>
+              <a:off x="2772136" y="3167536"/>
+              <a:ext cx="6228742" cy="565600"/>
+            </a:xfrm>
+            <a:prstGeom prst="rect">
+              <a:avLst/>
+            </a:prstGeom>
+            <a:solidFill>
+              <a:schemeClr val="bg1">
+                <a:lumMod val="85000"/>
+              </a:schemeClr>
+            </a:solidFill>
+            <a:ln>
+              <a:solidFill>
+                <a:schemeClr val="bg1">
+                  <a:lumMod val="85000"/>
+                </a:schemeClr>
+              </a:solidFill>
+            </a:ln>
+          </p:spPr>
+          <p:style>
+            <a:lnRef idx="2">
+              <a:schemeClr val="accent1">
+                <a:shade val="50000"/>
+              </a:schemeClr>
+            </a:lnRef>
+            <a:fillRef idx="1">
+              <a:schemeClr val="accent1"/>
+            </a:fillRef>
+            <a:effectRef idx="0">
+              <a:schemeClr val="accent1"/>
+            </a:effectRef>
+            <a:fontRef idx="minor">
+              <a:schemeClr val="lt1"/>
+            </a:fontRef>
+          </p:style>
+          <p:txBody>
+            <a:bodyPr rot="0" spcFirstLastPara="0" vertOverflow="overflow" horzOverflow="overflow" vert="horz" wrap="square" lIns="91440" tIns="45720" rIns="91440" bIns="45720" numCol="1" spcCol="0" rtlCol="0" fromWordArt="0" anchor="ctr" anchorCtr="0" forceAA="0" compatLnSpc="1">
+              <a:prstTxWarp prst="textNoShape">
+                <a:avLst/>
+              </a:prstTxWarp>
+              <a:noAutofit/>
+            </a:bodyPr>
+            <a:lstStyle/>
+            <a:p>
+              <a:r>
+                <a:rPr lang="en-US" sz="1200" b="1" dirty="0">
+                  <a:solidFill>
+                    <a:schemeClr val="tx1"/>
+                  </a:solidFill>
+                  <a:latin typeface="Times New Roman" panose="02020603050405020304" pitchFamily="18" charset="0"/>
+                  <a:cs typeface="Times New Roman" panose="02020603050405020304" pitchFamily="18" charset="0"/>
+                </a:rPr>
+                <a:t>Healthcare Pathway Performance Evaluation</a:t>
+              </a:r>
+            </a:p>
+            <a:p>
+              <a:pPr marL="171450" indent="-171450">
+                <a:buFont typeface="Arial" panose="020B0604020202020204" pitchFamily="34" charset="0"/>
+                <a:buChar char="•"/>
+              </a:pPr>
+              <a:r>
+                <a:rPr lang="en-US" sz="1200" dirty="0">
+                  <a:solidFill>
+                    <a:schemeClr val="tx1"/>
+                  </a:solidFill>
+                  <a:latin typeface="Times New Roman" panose="02020603050405020304" pitchFamily="18" charset="0"/>
+                  <a:cs typeface="Times New Roman" panose="02020603050405020304" pitchFamily="18" charset="0"/>
+                </a:rPr>
+                <a:t>Identify critical performance indicators such as hospital length of stay, and readmission rates</a:t>
+              </a:r>
+            </a:p>
+            <a:p>
+              <a:pPr marL="171450" indent="-171450">
+                <a:buFont typeface="Arial" panose="020B0604020202020204" pitchFamily="34" charset="0"/>
+                <a:buChar char="•"/>
+              </a:pPr>
+              <a:r>
+                <a:rPr lang="en-US" sz="1200" dirty="0">
+                  <a:solidFill>
+                    <a:schemeClr val="tx1"/>
+                  </a:solidFill>
+                  <a:latin typeface="Times New Roman" panose="02020603050405020304" pitchFamily="18" charset="0"/>
+                  <a:cs typeface="Times New Roman" panose="02020603050405020304" pitchFamily="18" charset="0"/>
+                </a:rPr>
+                <a:t>Evaluate and analyze healthcare pathway performance based on pathway variants</a:t>
+              </a:r>
+            </a:p>
+          </p:txBody>
+        </p:sp>
+      </p:grpSp>
+      <p:grpSp>
+        <p:nvGrpSpPr>
+          <p:cNvPr id="14" name="Group 13">
+            <a:extLst>
+              <a:ext uri="{FF2B5EF4-FFF2-40B4-BE49-F238E27FC236}">
+                <a16:creationId xmlns:a16="http://schemas.microsoft.com/office/drawing/2014/main" id="{D95830B1-E374-4D36-8C4D-EBDBB22D5414}"/>
+              </a:ext>
+            </a:extLst>
+          </p:cNvPr>
+          <p:cNvGrpSpPr/>
+          <p:nvPr/>
+        </p:nvGrpSpPr>
+        <p:grpSpPr>
+          <a:xfrm>
+            <a:off x="1336622" y="4059407"/>
+            <a:ext cx="7664255" cy="740532"/>
+            <a:chOff x="1336622" y="4059407"/>
+            <a:chExt cx="7664255" cy="740532"/>
+          </a:xfrm>
+        </p:grpSpPr>
+        <p:sp>
+          <p:nvSpPr>
+            <p:cNvPr id="5" name="Arrow: Chevron 4">
+              <a:extLst>
+                <a:ext uri="{FF2B5EF4-FFF2-40B4-BE49-F238E27FC236}">
+                  <a16:creationId xmlns:a16="http://schemas.microsoft.com/office/drawing/2014/main" id="{3ED5EE7A-00C0-46C4-B844-818CD19406CD}"/>
+                </a:ext>
+              </a:extLst>
+            </p:cNvPr>
+            <p:cNvSpPr/>
+            <p:nvPr/>
+          </p:nvSpPr>
+          <p:spPr>
+            <a:xfrm rot="5400000">
+              <a:off x="1684113" y="3711916"/>
+              <a:ext cx="740532" cy="1435514"/>
+            </a:xfrm>
+            <a:prstGeom prst="chevron">
+              <a:avLst>
+                <a:gd name="adj" fmla="val 24275"/>
+              </a:avLst>
+            </a:prstGeom>
+            <a:solidFill>
+              <a:schemeClr val="accent4">
+                <a:lumMod val="40000"/>
+                <a:lumOff val="60000"/>
+              </a:schemeClr>
+            </a:solidFill>
+            <a:ln>
+              <a:solidFill>
+                <a:schemeClr val="accent4">
+                  <a:lumMod val="40000"/>
+                  <a:lumOff val="60000"/>
+                </a:schemeClr>
+              </a:solidFill>
+            </a:ln>
+          </p:spPr>
+          <p:style>
+            <a:lnRef idx="2">
+              <a:schemeClr val="accent1">
+                <a:shade val="50000"/>
+              </a:schemeClr>
+            </a:lnRef>
+            <a:fillRef idx="1">
+              <a:schemeClr val="accent1"/>
+            </a:fillRef>
+            <a:effectRef idx="0">
+              <a:schemeClr val="accent1"/>
+            </a:effectRef>
+            <a:fontRef idx="minor">
+              <a:schemeClr val="lt1"/>
+            </a:fontRef>
+          </p:style>
+          <p:txBody>
+            <a:bodyPr vert="vert270" rtlCol="0" anchor="ctr"/>
+            <a:lstStyle/>
+            <a:p>
+              <a:pPr algn="ctr"/>
+              <a:r>
+                <a:rPr lang="en-US" sz="1200" b="1" dirty="0">
+                  <a:solidFill>
+                    <a:schemeClr val="tx1"/>
+                  </a:solidFill>
+                  <a:latin typeface="Times New Roman" panose="02020603050405020304" pitchFamily="18" charset="0"/>
+                  <a:cs typeface="Times New Roman" panose="02020603050405020304" pitchFamily="18" charset="0"/>
+                </a:rPr>
+                <a:t>Data Enrichment</a:t>
+              </a:r>
+            </a:p>
+          </p:txBody>
+        </p:sp>
+        <p:sp>
+          <p:nvSpPr>
+            <p:cNvPr id="13" name="Rectangle 12">
+              <a:extLst>
+                <a:ext uri="{FF2B5EF4-FFF2-40B4-BE49-F238E27FC236}">
+                  <a16:creationId xmlns:a16="http://schemas.microsoft.com/office/drawing/2014/main" id="{38791C0A-6307-4656-83D6-1437189362B0}"/>
+                </a:ext>
+              </a:extLst>
+            </p:cNvPr>
+            <p:cNvSpPr/>
+            <p:nvPr/>
+          </p:nvSpPr>
+          <p:spPr>
+            <a:xfrm>
+              <a:off x="2772135" y="4059407"/>
+              <a:ext cx="6228742" cy="565600"/>
+            </a:xfrm>
+            <a:prstGeom prst="rect">
+              <a:avLst/>
+            </a:prstGeom>
+            <a:solidFill>
+              <a:schemeClr val="bg1">
+                <a:lumMod val="85000"/>
+              </a:schemeClr>
+            </a:solidFill>
+            <a:ln>
+              <a:solidFill>
+                <a:schemeClr val="bg1">
+                  <a:lumMod val="85000"/>
+                </a:schemeClr>
+              </a:solidFill>
+            </a:ln>
+          </p:spPr>
+          <p:style>
+            <a:lnRef idx="2">
+              <a:schemeClr val="accent1">
+                <a:shade val="50000"/>
+              </a:schemeClr>
+            </a:lnRef>
+            <a:fillRef idx="1">
+              <a:schemeClr val="accent1"/>
+            </a:fillRef>
+            <a:effectRef idx="0">
+              <a:schemeClr val="accent1"/>
+            </a:effectRef>
+            <a:fontRef idx="minor">
+              <a:schemeClr val="lt1"/>
+            </a:fontRef>
+          </p:style>
+          <p:txBody>
+            <a:bodyPr rot="0" spcFirstLastPara="0" vertOverflow="overflow" horzOverflow="overflow" vert="horz" wrap="square" lIns="91440" tIns="45720" rIns="91440" bIns="45720" numCol="1" spcCol="0" rtlCol="0" fromWordArt="0" anchor="ctr" anchorCtr="0" forceAA="0" compatLnSpc="1">
+              <a:prstTxWarp prst="textNoShape">
+                <a:avLst/>
+              </a:prstTxWarp>
+              <a:noAutofit/>
+            </a:bodyPr>
+            <a:lstStyle/>
+            <a:p>
+              <a:endParaRPr lang="en-US" sz="1200" b="1" dirty="0">
+                <a:solidFill>
+                  <a:schemeClr val="tx1"/>
+                </a:solidFill>
+                <a:latin typeface="Times New Roman" panose="02020603050405020304" pitchFamily="18" charset="0"/>
+                <a:cs typeface="Times New Roman" panose="02020603050405020304" pitchFamily="18" charset="0"/>
+              </a:endParaRPr>
+            </a:p>
+            <a:p>
+              <a:r>
+                <a:rPr lang="en-US" sz="1200" b="1" dirty="0">
+                  <a:solidFill>
+                    <a:schemeClr val="tx1"/>
+                  </a:solidFill>
+                  <a:latin typeface="Times New Roman" panose="02020603050405020304" pitchFamily="18" charset="0"/>
+                  <a:cs typeface="Times New Roman" panose="02020603050405020304" pitchFamily="18" charset="0"/>
+                </a:rPr>
+                <a:t>Healthcare Pathway Performance Models</a:t>
+              </a:r>
+            </a:p>
+            <a:p>
+              <a:pPr marL="171450" indent="-171450">
+                <a:buFont typeface="Arial" panose="020B0604020202020204" pitchFamily="34" charset="0"/>
+                <a:buChar char="•"/>
+              </a:pPr>
+              <a:r>
+                <a:rPr lang="en-US" sz="1200" dirty="0">
+                  <a:solidFill>
+                    <a:schemeClr val="tx1"/>
+                  </a:solidFill>
+                  <a:latin typeface="Times New Roman" panose="02020603050405020304" pitchFamily="18" charset="0"/>
+                  <a:cs typeface="Times New Roman" panose="02020603050405020304" pitchFamily="18" charset="0"/>
+                </a:rPr>
+                <a:t>Develop machine learning models to identify risk factors</a:t>
+              </a:r>
+            </a:p>
+            <a:p>
+              <a:pPr marL="171450" indent="-171450">
+                <a:buFont typeface="Arial" panose="020B0604020202020204" pitchFamily="34" charset="0"/>
+                <a:buChar char="•"/>
+              </a:pPr>
+              <a:r>
+                <a:rPr lang="en-US" sz="1200" dirty="0">
+                  <a:solidFill>
+                    <a:schemeClr val="tx1"/>
+                  </a:solidFill>
+                  <a:latin typeface="Times New Roman" panose="02020603050405020304" pitchFamily="18" charset="0"/>
+                  <a:cs typeface="Times New Roman" panose="02020603050405020304" pitchFamily="18" charset="0"/>
+                </a:rPr>
+                <a:t>Identify possible means of improving pathway performance</a:t>
+              </a:r>
+            </a:p>
+            <a:p>
+              <a:endParaRPr lang="en-US" sz="1200" dirty="0">
+                <a:solidFill>
+                  <a:schemeClr val="tx1"/>
+                </a:solidFill>
+                <a:latin typeface="Times New Roman" panose="02020603050405020304" pitchFamily="18" charset="0"/>
+                <a:cs typeface="Times New Roman" panose="02020603050405020304" pitchFamily="18" charset="0"/>
+              </a:endParaRPr>
+            </a:p>
+          </p:txBody>
+        </p:sp>
+      </p:grpSp>
+      <p:cxnSp>
+        <p:nvCxnSpPr>
+          <p:cNvPr id="15" name="Straight Arrow Connector 14">
+            <a:extLst>
+              <a:ext uri="{FF2B5EF4-FFF2-40B4-BE49-F238E27FC236}">
+                <a16:creationId xmlns:a16="http://schemas.microsoft.com/office/drawing/2014/main" id="{25E8A3A7-2052-4BD9-8146-F9BB5BCB5635}"/>
+              </a:ext>
+            </a:extLst>
+          </p:cNvPr>
+          <p:cNvCxnSpPr>
+            <a:cxnSpLocks/>
+          </p:cNvCxnSpPr>
+          <p:nvPr/>
+        </p:nvCxnSpPr>
+        <p:spPr>
+          <a:xfrm flipH="1">
+            <a:off x="5886459" y="1139421"/>
+            <a:ext cx="93" cy="182880"/>
+          </a:xfrm>
+          <a:prstGeom prst="straightConnector1">
+            <a:avLst/>
+          </a:prstGeom>
+          <a:ln w="34925">
+            <a:solidFill>
+              <a:schemeClr val="tx1"/>
+            </a:solidFill>
+            <a:tailEnd type="triangle"/>
+          </a:ln>
+        </p:spPr>
+        <p:style>
+          <a:lnRef idx="1">
+            <a:schemeClr val="accent1"/>
+          </a:lnRef>
+          <a:fillRef idx="0">
+            <a:schemeClr val="accent1"/>
+          </a:fillRef>
+          <a:effectRef idx="0">
+            <a:schemeClr val="accent1"/>
+          </a:effectRef>
+          <a:fontRef idx="minor">
+            <a:schemeClr val="tx1"/>
+          </a:fontRef>
+        </p:style>
+      </p:cxnSp>
+      <p:cxnSp>
+        <p:nvCxnSpPr>
+          <p:cNvPr id="17" name="Straight Arrow Connector 16">
+            <a:extLst>
+              <a:ext uri="{FF2B5EF4-FFF2-40B4-BE49-F238E27FC236}">
+                <a16:creationId xmlns:a16="http://schemas.microsoft.com/office/drawing/2014/main" id="{4EA303BB-3825-4AED-8647-AF53A8153DE5}"/>
+              </a:ext>
+            </a:extLst>
+          </p:cNvPr>
+          <p:cNvCxnSpPr>
+            <a:cxnSpLocks/>
+          </p:cNvCxnSpPr>
+          <p:nvPr/>
+        </p:nvCxnSpPr>
+        <p:spPr>
+          <a:xfrm flipH="1">
+            <a:off x="5886459" y="2009293"/>
+            <a:ext cx="93" cy="182880"/>
+          </a:xfrm>
+          <a:prstGeom prst="straightConnector1">
+            <a:avLst/>
+          </a:prstGeom>
+          <a:ln w="34925">
+            <a:solidFill>
+              <a:schemeClr val="tx1"/>
+            </a:solidFill>
+            <a:tailEnd type="triangle"/>
+          </a:ln>
+        </p:spPr>
+        <p:style>
+          <a:lnRef idx="1">
+            <a:schemeClr val="accent1"/>
+          </a:lnRef>
+          <a:fillRef idx="0">
+            <a:schemeClr val="accent1"/>
+          </a:fillRef>
+          <a:effectRef idx="0">
+            <a:schemeClr val="accent1"/>
+          </a:effectRef>
+          <a:fontRef idx="minor">
+            <a:schemeClr val="tx1"/>
+          </a:fontRef>
+        </p:style>
+      </p:cxnSp>
+      <p:cxnSp>
+        <p:nvCxnSpPr>
+          <p:cNvPr id="18" name="Straight Arrow Connector 17">
+            <a:extLst>
+              <a:ext uri="{FF2B5EF4-FFF2-40B4-BE49-F238E27FC236}">
+                <a16:creationId xmlns:a16="http://schemas.microsoft.com/office/drawing/2014/main" id="{79645262-FDAA-4906-B479-413D5D03998B}"/>
+              </a:ext>
+            </a:extLst>
+          </p:cNvPr>
+          <p:cNvCxnSpPr>
+            <a:cxnSpLocks/>
+          </p:cNvCxnSpPr>
+          <p:nvPr/>
+        </p:nvCxnSpPr>
+        <p:spPr>
+          <a:xfrm flipH="1">
+            <a:off x="5886273" y="2924757"/>
+            <a:ext cx="93" cy="182880"/>
+          </a:xfrm>
+          <a:prstGeom prst="straightConnector1">
+            <a:avLst/>
+          </a:prstGeom>
+          <a:ln w="34925">
+            <a:solidFill>
+              <a:schemeClr val="tx1"/>
+            </a:solidFill>
+            <a:tailEnd type="triangle"/>
+          </a:ln>
+        </p:spPr>
+        <p:style>
+          <a:lnRef idx="1">
+            <a:schemeClr val="accent1"/>
+          </a:lnRef>
+          <a:fillRef idx="0">
+            <a:schemeClr val="accent1"/>
+          </a:fillRef>
+          <a:effectRef idx="0">
+            <a:schemeClr val="accent1"/>
+          </a:effectRef>
+          <a:fontRef idx="minor">
+            <a:schemeClr val="tx1"/>
+          </a:fontRef>
+        </p:style>
+      </p:cxnSp>
+      <p:cxnSp>
+        <p:nvCxnSpPr>
+          <p:cNvPr id="19" name="Straight Arrow Connector 18">
+            <a:extLst>
+              <a:ext uri="{FF2B5EF4-FFF2-40B4-BE49-F238E27FC236}">
+                <a16:creationId xmlns:a16="http://schemas.microsoft.com/office/drawing/2014/main" id="{CBA98366-349F-4AE6-A972-0684547CE643}"/>
+              </a:ext>
+            </a:extLst>
+          </p:cNvPr>
+          <p:cNvCxnSpPr>
+            <a:cxnSpLocks/>
+          </p:cNvCxnSpPr>
+          <p:nvPr/>
+        </p:nvCxnSpPr>
+        <p:spPr>
+          <a:xfrm flipH="1">
+            <a:off x="5886366" y="3816628"/>
+            <a:ext cx="93" cy="182880"/>
+          </a:xfrm>
+          <a:prstGeom prst="straightConnector1">
+            <a:avLst/>
+          </a:prstGeom>
+          <a:ln w="34925">
+            <a:solidFill>
+              <a:schemeClr val="tx1"/>
+            </a:solidFill>
+            <a:tailEnd type="triangle"/>
+          </a:ln>
+        </p:spPr>
+        <p:style>
+          <a:lnRef idx="1">
+            <a:schemeClr val="accent1"/>
+          </a:lnRef>
+          <a:fillRef idx="0">
+            <a:schemeClr val="accent1"/>
+          </a:fillRef>
+          <a:effectRef idx="0">
+            <a:schemeClr val="accent1"/>
+          </a:effectRef>
+          <a:fontRef idx="minor">
+            <a:schemeClr val="tx1"/>
+          </a:fontRef>
+        </p:style>
+      </p:cxnSp>
+      <p:grpSp>
+        <p:nvGrpSpPr>
+          <p:cNvPr id="20" name="Group 19">
+            <a:extLst>
+              <a:ext uri="{FF2B5EF4-FFF2-40B4-BE49-F238E27FC236}">
+                <a16:creationId xmlns:a16="http://schemas.microsoft.com/office/drawing/2014/main" id="{F495E13A-0A2A-4D04-A995-9E33FCF26E80}"/>
+              </a:ext>
+            </a:extLst>
+          </p:cNvPr>
+          <p:cNvGrpSpPr/>
+          <p:nvPr/>
+        </p:nvGrpSpPr>
+        <p:grpSpPr>
+          <a:xfrm>
+            <a:off x="9073897" y="787446"/>
+            <a:ext cx="206028" cy="879148"/>
+            <a:chOff x="9145458" y="774723"/>
+            <a:chExt cx="453225" cy="1125996"/>
+          </a:xfrm>
+        </p:grpSpPr>
+        <p:cxnSp>
+          <p:nvCxnSpPr>
+            <p:cNvPr id="21" name="Straight Arrow Connector 20">
+              <a:extLst>
+                <a:ext uri="{FF2B5EF4-FFF2-40B4-BE49-F238E27FC236}">
+                  <a16:creationId xmlns:a16="http://schemas.microsoft.com/office/drawing/2014/main" id="{843D7AD3-9B22-470C-AF1F-12EA0A973E2B}"/>
+                </a:ext>
+              </a:extLst>
+            </p:cNvPr>
+            <p:cNvCxnSpPr>
+              <a:cxnSpLocks/>
+            </p:cNvCxnSpPr>
+            <p:nvPr/>
+          </p:nvCxnSpPr>
+          <p:spPr>
+            <a:xfrm flipH="1">
+              <a:off x="9145458" y="774723"/>
+              <a:ext cx="453225" cy="0"/>
+            </a:xfrm>
+            <a:prstGeom prst="straightConnector1">
+              <a:avLst/>
+            </a:prstGeom>
+            <a:ln w="34925">
+              <a:solidFill>
+                <a:schemeClr val="tx1"/>
+              </a:solidFill>
+              <a:tailEnd type="triangle"/>
+            </a:ln>
+          </p:spPr>
+          <p:style>
+            <a:lnRef idx="1">
+              <a:schemeClr val="accent1"/>
+            </a:lnRef>
+            <a:fillRef idx="0">
+              <a:schemeClr val="accent1"/>
+            </a:fillRef>
+            <a:effectRef idx="0">
+              <a:schemeClr val="accent1"/>
+            </a:effectRef>
+            <a:fontRef idx="minor">
+              <a:schemeClr val="tx1"/>
+            </a:fontRef>
+          </p:style>
+        </p:cxnSp>
+        <p:cxnSp>
+          <p:nvCxnSpPr>
+            <p:cNvPr id="22" name="Straight Connector 21">
+              <a:extLst>
+                <a:ext uri="{FF2B5EF4-FFF2-40B4-BE49-F238E27FC236}">
+                  <a16:creationId xmlns:a16="http://schemas.microsoft.com/office/drawing/2014/main" id="{D765C344-E0B5-4E49-B93E-52E922DA59A4}"/>
+                </a:ext>
+              </a:extLst>
+            </p:cNvPr>
+            <p:cNvCxnSpPr>
+              <a:cxnSpLocks/>
+            </p:cNvCxnSpPr>
+            <p:nvPr/>
+          </p:nvCxnSpPr>
+          <p:spPr>
+            <a:xfrm>
+              <a:off x="9581322" y="774723"/>
+              <a:ext cx="0" cy="1125996"/>
+            </a:xfrm>
+            <a:prstGeom prst="line">
+              <a:avLst/>
+            </a:prstGeom>
+            <a:ln w="34925">
+              <a:solidFill>
+                <a:schemeClr val="tx1"/>
+              </a:solidFill>
+            </a:ln>
+          </p:spPr>
+          <p:style>
+            <a:lnRef idx="1">
+              <a:schemeClr val="accent1"/>
+            </a:lnRef>
+            <a:fillRef idx="0">
+              <a:schemeClr val="accent1"/>
+            </a:fillRef>
+            <a:effectRef idx="0">
+              <a:schemeClr val="accent1"/>
+            </a:effectRef>
+            <a:fontRef idx="minor">
+              <a:schemeClr val="tx1"/>
+            </a:fontRef>
+          </p:style>
+        </p:cxnSp>
+        <p:cxnSp>
+          <p:nvCxnSpPr>
+            <p:cNvPr id="23" name="Straight Connector 22">
+              <a:extLst>
+                <a:ext uri="{FF2B5EF4-FFF2-40B4-BE49-F238E27FC236}">
+                  <a16:creationId xmlns:a16="http://schemas.microsoft.com/office/drawing/2014/main" id="{6CE9C276-C328-44C3-B286-B62DCA3D6E65}"/>
+                </a:ext>
+              </a:extLst>
+            </p:cNvPr>
+            <p:cNvCxnSpPr/>
+            <p:nvPr/>
+          </p:nvCxnSpPr>
+          <p:spPr>
+            <a:xfrm>
+              <a:off x="9232299" y="1900719"/>
+              <a:ext cx="365760" cy="0"/>
+            </a:xfrm>
+            <a:prstGeom prst="line">
+              <a:avLst/>
+            </a:prstGeom>
+            <a:ln w="34925">
+              <a:solidFill>
+                <a:schemeClr val="tx1"/>
+              </a:solidFill>
+            </a:ln>
+          </p:spPr>
+          <p:style>
+            <a:lnRef idx="1">
+              <a:schemeClr val="accent1"/>
+            </a:lnRef>
+            <a:fillRef idx="0">
+              <a:schemeClr val="accent1"/>
+            </a:fillRef>
+            <a:effectRef idx="0">
+              <a:schemeClr val="accent1"/>
+            </a:effectRef>
+            <a:fontRef idx="minor">
+              <a:schemeClr val="tx1"/>
+            </a:fontRef>
+          </p:style>
+        </p:cxnSp>
+      </p:grpSp>
+    </p:spTree>
+    <p:extLst>
+      <p:ext uri="{BB962C8B-B14F-4D97-AF65-F5344CB8AC3E}">
+        <p14:creationId xmlns:p14="http://schemas.microsoft.com/office/powerpoint/2010/main" val="1416918473"/>
+      </p:ext>
+    </p:extLst>
+  </p:cSld>
+  <p:clrMapOvr>
+    <a:masterClrMapping/>
+  </p:clrMapOvr>
+</p:sld>
+</file>
+
 <file path=ppt/theme/theme1.xml><?xml version="1.0" encoding="utf-8"?>
 <a:theme xmlns:a="http://schemas.openxmlformats.org/drawingml/2006/main" name="Office Theme">
   <a:themeElements>

</xml_diff>

<commit_message>
Straithened out the pipeline.
</commit_message>
<xml_diff>
--- a/images/pipeline_diagram.pptx
+++ b/images/pipeline_diagram.pptx
@@ -13,6 +13,7 @@
     <p:sldId id="261" r:id="rId7"/>
     <p:sldId id="262" r:id="rId8"/>
     <p:sldId id="263" r:id="rId9"/>
+    <p:sldId id="264" r:id="rId10"/>
   </p:sldIdLst>
   <p:sldSz cx="12192000" cy="6858000"/>
   <p:notesSz cx="6858000" cy="9144000"/>
@@ -11694,6 +11695,1461 @@
 </p:sld>
 </file>
 
+<file path=ppt/slides/slide9.xml><?xml version="1.0" encoding="utf-8"?>
+<p:sld xmlns:a="http://schemas.openxmlformats.org/drawingml/2006/main" xmlns:r="http://schemas.openxmlformats.org/officeDocument/2006/relationships" xmlns:p="http://schemas.openxmlformats.org/presentationml/2006/main">
+  <p:cSld>
+    <p:spTree>
+      <p:nvGrpSpPr>
+        <p:cNvPr id="1" name=""/>
+        <p:cNvGrpSpPr/>
+        <p:nvPr/>
+      </p:nvGrpSpPr>
+      <p:grpSpPr>
+        <a:xfrm>
+          <a:off x="0" y="0"/>
+          <a:ext cx="0" cy="0"/>
+          <a:chOff x="0" y="0"/>
+          <a:chExt cx="0" cy="0"/>
+        </a:xfrm>
+      </p:grpSpPr>
+      <p:sp>
+        <p:nvSpPr>
+          <p:cNvPr id="4" name="Arrow: Chevron 3">
+            <a:extLst>
+              <a:ext uri="{FF2B5EF4-FFF2-40B4-BE49-F238E27FC236}">
+                <a16:creationId xmlns:a16="http://schemas.microsoft.com/office/drawing/2014/main" id="{3C386B56-5042-4FC8-BFE7-1A5F15D0BA5B}"/>
+              </a:ext>
+            </a:extLst>
+          </p:cNvPr>
+          <p:cNvSpPr/>
+          <p:nvPr/>
+        </p:nvSpPr>
+        <p:spPr>
+          <a:xfrm rot="5400000">
+            <a:off x="1684066" y="144385"/>
+            <a:ext cx="740532" cy="1435608"/>
+          </a:xfrm>
+          <a:prstGeom prst="chevron">
+            <a:avLst>
+              <a:gd name="adj" fmla="val 24275"/>
+            </a:avLst>
+          </a:prstGeom>
+          <a:solidFill>
+            <a:schemeClr val="accent6">
+              <a:lumMod val="60000"/>
+              <a:lumOff val="40000"/>
+            </a:schemeClr>
+          </a:solidFill>
+          <a:ln>
+            <a:solidFill>
+              <a:schemeClr val="accent6">
+                <a:lumMod val="60000"/>
+                <a:lumOff val="40000"/>
+              </a:schemeClr>
+            </a:solidFill>
+          </a:ln>
+        </p:spPr>
+        <p:style>
+          <a:lnRef idx="2">
+            <a:schemeClr val="accent1">
+              <a:shade val="50000"/>
+            </a:schemeClr>
+          </a:lnRef>
+          <a:fillRef idx="1">
+            <a:schemeClr val="accent1"/>
+          </a:fillRef>
+          <a:effectRef idx="0">
+            <a:schemeClr val="accent1"/>
+          </a:effectRef>
+          <a:fontRef idx="minor">
+            <a:schemeClr val="lt1"/>
+          </a:fontRef>
+        </p:style>
+        <p:txBody>
+          <a:bodyPr vert="vert270" rtlCol="0" anchor="ctr"/>
+          <a:lstStyle/>
+          <a:p>
+            <a:pPr algn="ctr"/>
+            <a:r>
+              <a:rPr lang="en-US" sz="1200" b="1" dirty="0">
+                <a:solidFill>
+                  <a:schemeClr val="tx1"/>
+                </a:solidFill>
+                <a:latin typeface="Times New Roman" panose="02020603050405020304" pitchFamily="18" charset="0"/>
+                <a:cs typeface="Times New Roman" panose="02020603050405020304" pitchFamily="18" charset="0"/>
+              </a:rPr>
+              <a:t>Pathway Discovery</a:t>
+            </a:r>
+          </a:p>
+        </p:txBody>
+      </p:sp>
+      <p:sp>
+        <p:nvSpPr>
+          <p:cNvPr id="8" name="Arrow: Chevron 7">
+            <a:extLst>
+              <a:ext uri="{FF2B5EF4-FFF2-40B4-BE49-F238E27FC236}">
+                <a16:creationId xmlns:a16="http://schemas.microsoft.com/office/drawing/2014/main" id="{D12F90B4-0BD8-4D12-9992-E15C37477304}"/>
+              </a:ext>
+            </a:extLst>
+          </p:cNvPr>
+          <p:cNvSpPr/>
+          <p:nvPr/>
+        </p:nvSpPr>
+        <p:spPr>
+          <a:xfrm rot="5400000">
+            <a:off x="1684113" y="1036303"/>
+            <a:ext cx="740532" cy="1435514"/>
+          </a:xfrm>
+          <a:prstGeom prst="chevron">
+            <a:avLst>
+              <a:gd name="adj" fmla="val 24275"/>
+            </a:avLst>
+          </a:prstGeom>
+          <a:solidFill>
+            <a:schemeClr val="accent6">
+              <a:lumMod val="60000"/>
+              <a:lumOff val="40000"/>
+            </a:schemeClr>
+          </a:solidFill>
+          <a:ln>
+            <a:solidFill>
+              <a:schemeClr val="accent6">
+                <a:lumMod val="60000"/>
+                <a:lumOff val="40000"/>
+              </a:schemeClr>
+            </a:solidFill>
+          </a:ln>
+        </p:spPr>
+        <p:style>
+          <a:lnRef idx="2">
+            <a:schemeClr val="accent1">
+              <a:shade val="50000"/>
+            </a:schemeClr>
+          </a:lnRef>
+          <a:fillRef idx="1">
+            <a:schemeClr val="accent1"/>
+          </a:fillRef>
+          <a:effectRef idx="0">
+            <a:schemeClr val="accent1"/>
+          </a:effectRef>
+          <a:fontRef idx="minor">
+            <a:schemeClr val="lt1"/>
+          </a:fontRef>
+        </p:style>
+        <p:txBody>
+          <a:bodyPr vert="vert270" rtlCol="0" anchor="ctr"/>
+          <a:lstStyle/>
+          <a:p>
+            <a:pPr algn="ctr"/>
+            <a:r>
+              <a:rPr lang="en-US" sz="1200" b="1" dirty="0">
+                <a:solidFill>
+                  <a:schemeClr val="tx1"/>
+                </a:solidFill>
+                <a:latin typeface="Times New Roman" panose="02020603050405020304" pitchFamily="18" charset="0"/>
+                <a:cs typeface="Times New Roman" panose="02020603050405020304" pitchFamily="18" charset="0"/>
+              </a:rPr>
+              <a:t>Pathway Discovery</a:t>
+            </a:r>
+          </a:p>
+        </p:txBody>
+      </p:sp>
+      <p:sp>
+        <p:nvSpPr>
+          <p:cNvPr id="9" name="Rectangle 8">
+            <a:extLst>
+              <a:ext uri="{FF2B5EF4-FFF2-40B4-BE49-F238E27FC236}">
+                <a16:creationId xmlns:a16="http://schemas.microsoft.com/office/drawing/2014/main" id="{6885163B-7BFD-4F53-BEAA-993F9835100F}"/>
+              </a:ext>
+            </a:extLst>
+          </p:cNvPr>
+          <p:cNvSpPr/>
+          <p:nvPr/>
+        </p:nvSpPr>
+        <p:spPr>
+          <a:xfrm>
+            <a:off x="2772135" y="491923"/>
+            <a:ext cx="6228741" cy="565600"/>
+          </a:xfrm>
+          <a:prstGeom prst="rect">
+            <a:avLst/>
+          </a:prstGeom>
+          <a:solidFill>
+            <a:schemeClr val="bg1">
+              <a:lumMod val="85000"/>
+            </a:schemeClr>
+          </a:solidFill>
+          <a:ln>
+            <a:solidFill>
+              <a:schemeClr val="bg1">
+                <a:lumMod val="85000"/>
+              </a:schemeClr>
+            </a:solidFill>
+          </a:ln>
+        </p:spPr>
+        <p:style>
+          <a:lnRef idx="2">
+            <a:schemeClr val="accent1">
+              <a:shade val="50000"/>
+            </a:schemeClr>
+          </a:lnRef>
+          <a:fillRef idx="1">
+            <a:schemeClr val="accent1"/>
+          </a:fillRef>
+          <a:effectRef idx="0">
+            <a:schemeClr val="accent1"/>
+          </a:effectRef>
+          <a:fontRef idx="minor">
+            <a:schemeClr val="lt1"/>
+          </a:fontRef>
+        </p:style>
+        <p:txBody>
+          <a:bodyPr rot="0" spcFirstLastPara="0" vertOverflow="overflow" horzOverflow="overflow" vert="horz" wrap="square" lIns="91440" tIns="45720" rIns="91440" bIns="45720" numCol="1" spcCol="0" rtlCol="0" fromWordArt="0" anchor="ctr" anchorCtr="0" forceAA="0" compatLnSpc="1">
+            <a:prstTxWarp prst="textNoShape">
+              <a:avLst/>
+            </a:prstTxWarp>
+            <a:noAutofit/>
+          </a:bodyPr>
+          <a:lstStyle/>
+          <a:p>
+            <a:r>
+              <a:rPr lang="en-US" sz="1200" b="1" dirty="0">
+                <a:solidFill>
+                  <a:schemeClr val="tx1"/>
+                </a:solidFill>
+                <a:latin typeface="Times New Roman" panose="02020603050405020304" pitchFamily="18" charset="0"/>
+                <a:cs typeface="Times New Roman" panose="02020603050405020304" pitchFamily="18" charset="0"/>
+              </a:rPr>
+              <a:t>Clinical Data Processing</a:t>
+            </a:r>
+          </a:p>
+          <a:p>
+            <a:pPr marL="171450" indent="-171450">
+              <a:buFont typeface="Arial" panose="020B0604020202020204" pitchFamily="34" charset="0"/>
+              <a:buChar char="•"/>
+            </a:pPr>
+            <a:r>
+              <a:rPr lang="en-US" sz="1200" dirty="0">
+                <a:solidFill>
+                  <a:schemeClr val="tx1"/>
+                </a:solidFill>
+                <a:latin typeface="Times New Roman" panose="02020603050405020304" pitchFamily="18" charset="0"/>
+                <a:cs typeface="Times New Roman" panose="02020603050405020304" pitchFamily="18" charset="0"/>
+              </a:rPr>
+              <a:t>Identify and condense repetitive activity patterns</a:t>
+            </a:r>
+          </a:p>
+          <a:p>
+            <a:pPr marL="171450" indent="-171450">
+              <a:buFont typeface="Arial" panose="020B0604020202020204" pitchFamily="34" charset="0"/>
+              <a:buChar char="•"/>
+            </a:pPr>
+            <a:r>
+              <a:rPr lang="en-US" sz="1200" dirty="0">
+                <a:solidFill>
+                  <a:schemeClr val="tx1"/>
+                </a:solidFill>
+                <a:latin typeface="Times New Roman" panose="02020603050405020304" pitchFamily="18" charset="0"/>
+                <a:cs typeface="Times New Roman" panose="02020603050405020304" pitchFamily="18" charset="0"/>
+              </a:rPr>
+              <a:t>Cluster clinical activities by departments</a:t>
+            </a:r>
+          </a:p>
+        </p:txBody>
+      </p:sp>
+      <p:sp>
+        <p:nvSpPr>
+          <p:cNvPr id="10" name="Rectangle 9">
+            <a:extLst>
+              <a:ext uri="{FF2B5EF4-FFF2-40B4-BE49-F238E27FC236}">
+                <a16:creationId xmlns:a16="http://schemas.microsoft.com/office/drawing/2014/main" id="{9B825A72-9F44-4778-925B-BFF2AE985CA0}"/>
+              </a:ext>
+            </a:extLst>
+          </p:cNvPr>
+          <p:cNvSpPr/>
+          <p:nvPr/>
+        </p:nvSpPr>
+        <p:spPr>
+          <a:xfrm>
+            <a:off x="2772136" y="1383794"/>
+            <a:ext cx="6228742" cy="565600"/>
+          </a:xfrm>
+          <a:prstGeom prst="rect">
+            <a:avLst/>
+          </a:prstGeom>
+          <a:solidFill>
+            <a:schemeClr val="bg1">
+              <a:lumMod val="85000"/>
+            </a:schemeClr>
+          </a:solidFill>
+          <a:ln>
+            <a:solidFill>
+              <a:schemeClr val="bg1">
+                <a:lumMod val="85000"/>
+              </a:schemeClr>
+            </a:solidFill>
+          </a:ln>
+        </p:spPr>
+        <p:style>
+          <a:lnRef idx="2">
+            <a:schemeClr val="accent1">
+              <a:shade val="50000"/>
+            </a:schemeClr>
+          </a:lnRef>
+          <a:fillRef idx="1">
+            <a:schemeClr val="accent1"/>
+          </a:fillRef>
+          <a:effectRef idx="0">
+            <a:schemeClr val="accent1"/>
+          </a:effectRef>
+          <a:fontRef idx="minor">
+            <a:schemeClr val="lt1"/>
+          </a:fontRef>
+        </p:style>
+        <p:txBody>
+          <a:bodyPr rot="0" spcFirstLastPara="0" vertOverflow="overflow" horzOverflow="overflow" vert="horz" wrap="square" lIns="91440" tIns="45720" rIns="91440" bIns="45720" numCol="1" spcCol="0" rtlCol="0" fromWordArt="0" anchor="ctr" anchorCtr="0" forceAA="0" compatLnSpc="1">
+            <a:prstTxWarp prst="textNoShape">
+              <a:avLst/>
+            </a:prstTxWarp>
+            <a:noAutofit/>
+          </a:bodyPr>
+          <a:lstStyle/>
+          <a:p>
+            <a:r>
+              <a:rPr lang="en-US" sz="1200" b="1" dirty="0">
+                <a:solidFill>
+                  <a:schemeClr val="tx1"/>
+                </a:solidFill>
+                <a:latin typeface="Times New Roman" panose="02020603050405020304" pitchFamily="18" charset="0"/>
+                <a:cs typeface="Times New Roman" panose="02020603050405020304" pitchFamily="18" charset="0"/>
+              </a:rPr>
+              <a:t>Pathway Visualization</a:t>
+            </a:r>
+          </a:p>
+          <a:p>
+            <a:pPr marL="171450" indent="-171450">
+              <a:buFont typeface="Arial" panose="020B0604020202020204" pitchFamily="34" charset="0"/>
+              <a:buChar char="•"/>
+            </a:pPr>
+            <a:r>
+              <a:rPr lang="en-US" sz="1200" dirty="0">
+                <a:solidFill>
+                  <a:schemeClr val="tx1"/>
+                </a:solidFill>
+                <a:latin typeface="Times New Roman" panose="02020603050405020304" pitchFamily="18" charset="0"/>
+                <a:cs typeface="Times New Roman" panose="02020603050405020304" pitchFamily="18" charset="0"/>
+              </a:rPr>
+              <a:t>Import processed data into ProM</a:t>
+            </a:r>
+          </a:p>
+          <a:p>
+            <a:pPr marL="171450" indent="-171450">
+              <a:buFont typeface="Arial" panose="020B0604020202020204" pitchFamily="34" charset="0"/>
+              <a:buChar char="•"/>
+            </a:pPr>
+            <a:r>
+              <a:rPr lang="en-US" sz="1200" dirty="0">
+                <a:solidFill>
+                  <a:schemeClr val="tx1"/>
+                </a:solidFill>
+                <a:latin typeface="Times New Roman" panose="02020603050405020304" pitchFamily="18" charset="0"/>
+                <a:cs typeface="Times New Roman" panose="02020603050405020304" pitchFamily="18" charset="0"/>
+              </a:rPr>
+              <a:t>Use ProM functions to discover and review healthcare pathways</a:t>
+            </a:r>
+          </a:p>
+        </p:txBody>
+      </p:sp>
+      <p:grpSp>
+        <p:nvGrpSpPr>
+          <p:cNvPr id="2" name="Group 1">
+            <a:extLst>
+              <a:ext uri="{FF2B5EF4-FFF2-40B4-BE49-F238E27FC236}">
+                <a16:creationId xmlns:a16="http://schemas.microsoft.com/office/drawing/2014/main" id="{34AD6C34-30DD-4D71-BF09-E29ACDFACF28}"/>
+              </a:ext>
+            </a:extLst>
+          </p:cNvPr>
+          <p:cNvGrpSpPr/>
+          <p:nvPr/>
+        </p:nvGrpSpPr>
+        <p:grpSpPr>
+          <a:xfrm>
+            <a:off x="1336622" y="2275665"/>
+            <a:ext cx="7664256" cy="740532"/>
+            <a:chOff x="1336622" y="2275665"/>
+            <a:chExt cx="7664256" cy="740532"/>
+          </a:xfrm>
+        </p:grpSpPr>
+        <p:sp>
+          <p:nvSpPr>
+            <p:cNvPr id="6" name="Arrow: Chevron 5">
+              <a:extLst>
+                <a:ext uri="{FF2B5EF4-FFF2-40B4-BE49-F238E27FC236}">
+                  <a16:creationId xmlns:a16="http://schemas.microsoft.com/office/drawing/2014/main" id="{A8142872-3756-4981-A875-5A0D2C4362D5}"/>
+                </a:ext>
+              </a:extLst>
+            </p:cNvPr>
+            <p:cNvSpPr/>
+            <p:nvPr/>
+          </p:nvSpPr>
+          <p:spPr>
+            <a:xfrm rot="5400000">
+              <a:off x="1684113" y="1928174"/>
+              <a:ext cx="740532" cy="1435514"/>
+            </a:xfrm>
+            <a:prstGeom prst="chevron">
+              <a:avLst>
+                <a:gd name="adj" fmla="val 24275"/>
+              </a:avLst>
+            </a:prstGeom>
+            <a:solidFill>
+              <a:schemeClr val="accent5">
+                <a:lumMod val="60000"/>
+                <a:lumOff val="40000"/>
+              </a:schemeClr>
+            </a:solidFill>
+            <a:ln>
+              <a:solidFill>
+                <a:schemeClr val="accent1">
+                  <a:lumMod val="40000"/>
+                  <a:lumOff val="60000"/>
+                </a:schemeClr>
+              </a:solidFill>
+            </a:ln>
+          </p:spPr>
+          <p:style>
+            <a:lnRef idx="2">
+              <a:schemeClr val="accent1">
+                <a:shade val="50000"/>
+              </a:schemeClr>
+            </a:lnRef>
+            <a:fillRef idx="1">
+              <a:schemeClr val="accent1"/>
+            </a:fillRef>
+            <a:effectRef idx="0">
+              <a:schemeClr val="accent1"/>
+            </a:effectRef>
+            <a:fontRef idx="minor">
+              <a:schemeClr val="lt1"/>
+            </a:fontRef>
+          </p:style>
+          <p:txBody>
+            <a:bodyPr vert="vert270" rtlCol="0" anchor="ctr"/>
+            <a:lstStyle/>
+            <a:p>
+              <a:pPr algn="ctr"/>
+              <a:r>
+                <a:rPr lang="en-US" sz="1200" b="1" dirty="0">
+                  <a:solidFill>
+                    <a:schemeClr val="tx1"/>
+                  </a:solidFill>
+                  <a:latin typeface="Times New Roman" panose="02020603050405020304" pitchFamily="18" charset="0"/>
+                  <a:cs typeface="Times New Roman" panose="02020603050405020304" pitchFamily="18" charset="0"/>
+                </a:rPr>
+                <a:t>Conformance</a:t>
+              </a:r>
+            </a:p>
+          </p:txBody>
+        </p:sp>
+        <p:sp>
+          <p:nvSpPr>
+            <p:cNvPr id="11" name="Rectangle 10">
+              <a:extLst>
+                <a:ext uri="{FF2B5EF4-FFF2-40B4-BE49-F238E27FC236}">
+                  <a16:creationId xmlns:a16="http://schemas.microsoft.com/office/drawing/2014/main" id="{35323A90-87B0-4ABD-A0E2-F4366205CC94}"/>
+                </a:ext>
+              </a:extLst>
+            </p:cNvPr>
+            <p:cNvSpPr/>
+            <p:nvPr/>
+          </p:nvSpPr>
+          <p:spPr>
+            <a:xfrm>
+              <a:off x="2772136" y="2275665"/>
+              <a:ext cx="6228742" cy="565600"/>
+            </a:xfrm>
+            <a:prstGeom prst="rect">
+              <a:avLst/>
+            </a:prstGeom>
+            <a:solidFill>
+              <a:schemeClr val="bg1">
+                <a:lumMod val="85000"/>
+              </a:schemeClr>
+            </a:solidFill>
+            <a:ln>
+              <a:solidFill>
+                <a:schemeClr val="bg1">
+                  <a:lumMod val="85000"/>
+                </a:schemeClr>
+              </a:solidFill>
+            </a:ln>
+          </p:spPr>
+          <p:style>
+            <a:lnRef idx="2">
+              <a:schemeClr val="accent1">
+                <a:shade val="50000"/>
+              </a:schemeClr>
+            </a:lnRef>
+            <a:fillRef idx="1">
+              <a:schemeClr val="accent1"/>
+            </a:fillRef>
+            <a:effectRef idx="0">
+              <a:schemeClr val="accent1"/>
+            </a:effectRef>
+            <a:fontRef idx="minor">
+              <a:schemeClr val="lt1"/>
+            </a:fontRef>
+          </p:style>
+          <p:txBody>
+            <a:bodyPr rot="0" spcFirstLastPara="0" vertOverflow="overflow" horzOverflow="overflow" vert="horz" wrap="square" lIns="91440" tIns="45720" rIns="91440" bIns="45720" numCol="1" spcCol="0" rtlCol="0" fromWordArt="0" anchor="ctr" anchorCtr="0" forceAA="0" compatLnSpc="1">
+              <a:prstTxWarp prst="textNoShape">
+                <a:avLst/>
+              </a:prstTxWarp>
+              <a:noAutofit/>
+            </a:bodyPr>
+            <a:lstStyle/>
+            <a:p>
+              <a:r>
+                <a:rPr lang="en-US" sz="1200" b="1" dirty="0">
+                  <a:solidFill>
+                    <a:schemeClr val="tx1"/>
+                  </a:solidFill>
+                  <a:latin typeface="Times New Roman" panose="02020603050405020304" pitchFamily="18" charset="0"/>
+                  <a:cs typeface="Times New Roman" panose="02020603050405020304" pitchFamily="18" charset="0"/>
+                </a:rPr>
+                <a:t>Conformance Analysis</a:t>
+              </a:r>
+            </a:p>
+            <a:p>
+              <a:pPr marL="171450" indent="-171450">
+                <a:buFont typeface="Arial" panose="020B0604020202020204" pitchFamily="34" charset="0"/>
+                <a:buChar char="•"/>
+              </a:pPr>
+              <a:r>
+                <a:rPr lang="en-US" sz="1200" dirty="0">
+                  <a:solidFill>
+                    <a:schemeClr val="tx1"/>
+                  </a:solidFill>
+                  <a:latin typeface="Times New Roman" panose="02020603050405020304" pitchFamily="18" charset="0"/>
+                  <a:cs typeface="Times New Roman" panose="02020603050405020304" pitchFamily="18" charset="0"/>
+                </a:rPr>
+                <a:t>Identify patient deviations from healthcare pathways</a:t>
+              </a:r>
+            </a:p>
+            <a:p>
+              <a:pPr marL="171450" indent="-171450">
+                <a:buFont typeface="Arial" panose="020B0604020202020204" pitchFamily="34" charset="0"/>
+                <a:buChar char="•"/>
+              </a:pPr>
+              <a:r>
+                <a:rPr lang="en-US" sz="1200" dirty="0">
+                  <a:solidFill>
+                    <a:schemeClr val="tx1"/>
+                  </a:solidFill>
+                  <a:latin typeface="Times New Roman" panose="02020603050405020304" pitchFamily="18" charset="0"/>
+                  <a:cs typeface="Times New Roman" panose="02020603050405020304" pitchFamily="18" charset="0"/>
+                </a:rPr>
+                <a:t>Adjust healthcare pathways according to deviations</a:t>
+              </a:r>
+            </a:p>
+          </p:txBody>
+        </p:sp>
+      </p:grpSp>
+      <p:grpSp>
+        <p:nvGrpSpPr>
+          <p:cNvPr id="3" name="Group 2">
+            <a:extLst>
+              <a:ext uri="{FF2B5EF4-FFF2-40B4-BE49-F238E27FC236}">
+                <a16:creationId xmlns:a16="http://schemas.microsoft.com/office/drawing/2014/main" id="{A4CA2D6D-A876-4EE4-B74A-5880D9BBA98F}"/>
+              </a:ext>
+            </a:extLst>
+          </p:cNvPr>
+          <p:cNvGrpSpPr/>
+          <p:nvPr/>
+        </p:nvGrpSpPr>
+        <p:grpSpPr>
+          <a:xfrm>
+            <a:off x="1336622" y="3167536"/>
+            <a:ext cx="7664256" cy="740532"/>
+            <a:chOff x="1336622" y="3167536"/>
+            <a:chExt cx="7664256" cy="740532"/>
+          </a:xfrm>
+        </p:grpSpPr>
+        <p:sp>
+          <p:nvSpPr>
+            <p:cNvPr id="7" name="Arrow: Chevron 6">
+              <a:extLst>
+                <a:ext uri="{FF2B5EF4-FFF2-40B4-BE49-F238E27FC236}">
+                  <a16:creationId xmlns:a16="http://schemas.microsoft.com/office/drawing/2014/main" id="{19465C67-EF27-4B4A-9175-DBC54B846B22}"/>
+                </a:ext>
+              </a:extLst>
+            </p:cNvPr>
+            <p:cNvSpPr/>
+            <p:nvPr/>
+          </p:nvSpPr>
+          <p:spPr>
+            <a:xfrm rot="5400000">
+              <a:off x="1684113" y="2820045"/>
+              <a:ext cx="740532" cy="1435514"/>
+            </a:xfrm>
+            <a:prstGeom prst="chevron">
+              <a:avLst>
+                <a:gd name="adj" fmla="val 24275"/>
+              </a:avLst>
+            </a:prstGeom>
+            <a:solidFill>
+              <a:schemeClr val="accent4">
+                <a:lumMod val="40000"/>
+                <a:lumOff val="60000"/>
+              </a:schemeClr>
+            </a:solidFill>
+            <a:ln>
+              <a:solidFill>
+                <a:schemeClr val="accent4">
+                  <a:lumMod val="40000"/>
+                  <a:lumOff val="60000"/>
+                </a:schemeClr>
+              </a:solidFill>
+            </a:ln>
+          </p:spPr>
+          <p:style>
+            <a:lnRef idx="2">
+              <a:schemeClr val="accent1">
+                <a:shade val="50000"/>
+              </a:schemeClr>
+            </a:lnRef>
+            <a:fillRef idx="1">
+              <a:schemeClr val="accent1"/>
+            </a:fillRef>
+            <a:effectRef idx="0">
+              <a:schemeClr val="accent1"/>
+            </a:effectRef>
+            <a:fontRef idx="minor">
+              <a:schemeClr val="lt1"/>
+            </a:fontRef>
+          </p:style>
+          <p:txBody>
+            <a:bodyPr vert="vert270" rtlCol="0" anchor="ctr"/>
+            <a:lstStyle/>
+            <a:p>
+              <a:pPr algn="ctr"/>
+              <a:r>
+                <a:rPr lang="en-US" sz="1200" b="1" dirty="0">
+                  <a:solidFill>
+                    <a:schemeClr val="tx1"/>
+                  </a:solidFill>
+                  <a:latin typeface="Times New Roman" panose="02020603050405020304" pitchFamily="18" charset="0"/>
+                  <a:cs typeface="Times New Roman" panose="02020603050405020304" pitchFamily="18" charset="0"/>
+                </a:rPr>
+                <a:t>Data Enrichment</a:t>
+              </a:r>
+            </a:p>
+          </p:txBody>
+        </p:sp>
+        <p:sp>
+          <p:nvSpPr>
+            <p:cNvPr id="12" name="Rectangle 11">
+              <a:extLst>
+                <a:ext uri="{FF2B5EF4-FFF2-40B4-BE49-F238E27FC236}">
+                  <a16:creationId xmlns:a16="http://schemas.microsoft.com/office/drawing/2014/main" id="{EF3CB7C1-77EF-4DD9-BEF9-6286B8A73F64}"/>
+                </a:ext>
+              </a:extLst>
+            </p:cNvPr>
+            <p:cNvSpPr/>
+            <p:nvPr/>
+          </p:nvSpPr>
+          <p:spPr>
+            <a:xfrm>
+              <a:off x="2772136" y="3167536"/>
+              <a:ext cx="6228742" cy="565600"/>
+            </a:xfrm>
+            <a:prstGeom prst="rect">
+              <a:avLst/>
+            </a:prstGeom>
+            <a:solidFill>
+              <a:schemeClr val="bg1">
+                <a:lumMod val="85000"/>
+              </a:schemeClr>
+            </a:solidFill>
+            <a:ln>
+              <a:solidFill>
+                <a:schemeClr val="bg1">
+                  <a:lumMod val="85000"/>
+                </a:schemeClr>
+              </a:solidFill>
+            </a:ln>
+          </p:spPr>
+          <p:style>
+            <a:lnRef idx="2">
+              <a:schemeClr val="accent1">
+                <a:shade val="50000"/>
+              </a:schemeClr>
+            </a:lnRef>
+            <a:fillRef idx="1">
+              <a:schemeClr val="accent1"/>
+            </a:fillRef>
+            <a:effectRef idx="0">
+              <a:schemeClr val="accent1"/>
+            </a:effectRef>
+            <a:fontRef idx="minor">
+              <a:schemeClr val="lt1"/>
+            </a:fontRef>
+          </p:style>
+          <p:txBody>
+            <a:bodyPr rot="0" spcFirstLastPara="0" vertOverflow="overflow" horzOverflow="overflow" vert="horz" wrap="square" lIns="91440" tIns="45720" rIns="91440" bIns="45720" numCol="1" spcCol="0" rtlCol="0" fromWordArt="0" anchor="ctr" anchorCtr="0" forceAA="0" compatLnSpc="1">
+              <a:prstTxWarp prst="textNoShape">
+                <a:avLst/>
+              </a:prstTxWarp>
+              <a:noAutofit/>
+            </a:bodyPr>
+            <a:lstStyle/>
+            <a:p>
+              <a:r>
+                <a:rPr lang="en-US" sz="1200" b="1" dirty="0">
+                  <a:solidFill>
+                    <a:schemeClr val="tx1"/>
+                  </a:solidFill>
+                  <a:latin typeface="Times New Roman" panose="02020603050405020304" pitchFamily="18" charset="0"/>
+                  <a:cs typeface="Times New Roman" panose="02020603050405020304" pitchFamily="18" charset="0"/>
+                </a:rPr>
+                <a:t>Healthcare Pathway Performance Evaluation</a:t>
+              </a:r>
+            </a:p>
+            <a:p>
+              <a:pPr marL="171450" indent="-171450">
+                <a:buFont typeface="Arial" panose="020B0604020202020204" pitchFamily="34" charset="0"/>
+                <a:buChar char="•"/>
+              </a:pPr>
+              <a:r>
+                <a:rPr lang="en-US" sz="1200" dirty="0">
+                  <a:solidFill>
+                    <a:schemeClr val="tx1"/>
+                  </a:solidFill>
+                  <a:latin typeface="Times New Roman" panose="02020603050405020304" pitchFamily="18" charset="0"/>
+                  <a:cs typeface="Times New Roman" panose="02020603050405020304" pitchFamily="18" charset="0"/>
+                </a:rPr>
+                <a:t>Identify critical performance indicators such as hospital length of stay, and readmission rates</a:t>
+              </a:r>
+            </a:p>
+            <a:p>
+              <a:pPr marL="171450" indent="-171450">
+                <a:buFont typeface="Arial" panose="020B0604020202020204" pitchFamily="34" charset="0"/>
+                <a:buChar char="•"/>
+              </a:pPr>
+              <a:r>
+                <a:rPr lang="en-US" sz="1200" dirty="0">
+                  <a:solidFill>
+                    <a:schemeClr val="tx1"/>
+                  </a:solidFill>
+                  <a:latin typeface="Times New Roman" panose="02020603050405020304" pitchFamily="18" charset="0"/>
+                  <a:cs typeface="Times New Roman" panose="02020603050405020304" pitchFamily="18" charset="0"/>
+                </a:rPr>
+                <a:t>Evaluate and analyze healthcare pathway performance based on pathway variants</a:t>
+              </a:r>
+            </a:p>
+          </p:txBody>
+        </p:sp>
+      </p:grpSp>
+      <p:grpSp>
+        <p:nvGrpSpPr>
+          <p:cNvPr id="14" name="Group 13">
+            <a:extLst>
+              <a:ext uri="{FF2B5EF4-FFF2-40B4-BE49-F238E27FC236}">
+                <a16:creationId xmlns:a16="http://schemas.microsoft.com/office/drawing/2014/main" id="{D95830B1-E374-4D36-8C4D-EBDBB22D5414}"/>
+              </a:ext>
+            </a:extLst>
+          </p:cNvPr>
+          <p:cNvGrpSpPr/>
+          <p:nvPr/>
+        </p:nvGrpSpPr>
+        <p:grpSpPr>
+          <a:xfrm>
+            <a:off x="1336622" y="4059407"/>
+            <a:ext cx="7664255" cy="740532"/>
+            <a:chOff x="1336622" y="4059407"/>
+            <a:chExt cx="7664255" cy="740532"/>
+          </a:xfrm>
+        </p:grpSpPr>
+        <p:sp>
+          <p:nvSpPr>
+            <p:cNvPr id="5" name="Arrow: Chevron 4">
+              <a:extLst>
+                <a:ext uri="{FF2B5EF4-FFF2-40B4-BE49-F238E27FC236}">
+                  <a16:creationId xmlns:a16="http://schemas.microsoft.com/office/drawing/2014/main" id="{3ED5EE7A-00C0-46C4-B844-818CD19406CD}"/>
+                </a:ext>
+              </a:extLst>
+            </p:cNvPr>
+            <p:cNvSpPr/>
+            <p:nvPr/>
+          </p:nvSpPr>
+          <p:spPr>
+            <a:xfrm rot="5400000">
+              <a:off x="1684113" y="3711916"/>
+              <a:ext cx="740532" cy="1435514"/>
+            </a:xfrm>
+            <a:prstGeom prst="chevron">
+              <a:avLst>
+                <a:gd name="adj" fmla="val 24275"/>
+              </a:avLst>
+            </a:prstGeom>
+            <a:solidFill>
+              <a:schemeClr val="accent4">
+                <a:lumMod val="40000"/>
+                <a:lumOff val="60000"/>
+              </a:schemeClr>
+            </a:solidFill>
+            <a:ln>
+              <a:solidFill>
+                <a:schemeClr val="accent4">
+                  <a:lumMod val="40000"/>
+                  <a:lumOff val="60000"/>
+                </a:schemeClr>
+              </a:solidFill>
+            </a:ln>
+          </p:spPr>
+          <p:style>
+            <a:lnRef idx="2">
+              <a:schemeClr val="accent1">
+                <a:shade val="50000"/>
+              </a:schemeClr>
+            </a:lnRef>
+            <a:fillRef idx="1">
+              <a:schemeClr val="accent1"/>
+            </a:fillRef>
+            <a:effectRef idx="0">
+              <a:schemeClr val="accent1"/>
+            </a:effectRef>
+            <a:fontRef idx="minor">
+              <a:schemeClr val="lt1"/>
+            </a:fontRef>
+          </p:style>
+          <p:txBody>
+            <a:bodyPr vert="vert270" rtlCol="0" anchor="ctr"/>
+            <a:lstStyle/>
+            <a:p>
+              <a:pPr algn="ctr"/>
+              <a:r>
+                <a:rPr lang="en-US" sz="1200" b="1" dirty="0">
+                  <a:solidFill>
+                    <a:schemeClr val="tx1"/>
+                  </a:solidFill>
+                  <a:latin typeface="Times New Roman" panose="02020603050405020304" pitchFamily="18" charset="0"/>
+                  <a:cs typeface="Times New Roman" panose="02020603050405020304" pitchFamily="18" charset="0"/>
+                </a:rPr>
+                <a:t>Data Enrichment</a:t>
+              </a:r>
+            </a:p>
+          </p:txBody>
+        </p:sp>
+        <p:sp>
+          <p:nvSpPr>
+            <p:cNvPr id="13" name="Rectangle 12">
+              <a:extLst>
+                <a:ext uri="{FF2B5EF4-FFF2-40B4-BE49-F238E27FC236}">
+                  <a16:creationId xmlns:a16="http://schemas.microsoft.com/office/drawing/2014/main" id="{38791C0A-6307-4656-83D6-1437189362B0}"/>
+                </a:ext>
+              </a:extLst>
+            </p:cNvPr>
+            <p:cNvSpPr/>
+            <p:nvPr/>
+          </p:nvSpPr>
+          <p:spPr>
+            <a:xfrm>
+              <a:off x="2772135" y="4059407"/>
+              <a:ext cx="6228742" cy="565600"/>
+            </a:xfrm>
+            <a:prstGeom prst="rect">
+              <a:avLst/>
+            </a:prstGeom>
+            <a:solidFill>
+              <a:schemeClr val="bg1">
+                <a:lumMod val="85000"/>
+              </a:schemeClr>
+            </a:solidFill>
+            <a:ln>
+              <a:solidFill>
+                <a:schemeClr val="bg1">
+                  <a:lumMod val="85000"/>
+                </a:schemeClr>
+              </a:solidFill>
+            </a:ln>
+          </p:spPr>
+          <p:style>
+            <a:lnRef idx="2">
+              <a:schemeClr val="accent1">
+                <a:shade val="50000"/>
+              </a:schemeClr>
+            </a:lnRef>
+            <a:fillRef idx="1">
+              <a:schemeClr val="accent1"/>
+            </a:fillRef>
+            <a:effectRef idx="0">
+              <a:schemeClr val="accent1"/>
+            </a:effectRef>
+            <a:fontRef idx="minor">
+              <a:schemeClr val="lt1"/>
+            </a:fontRef>
+          </p:style>
+          <p:txBody>
+            <a:bodyPr rot="0" spcFirstLastPara="0" vertOverflow="overflow" horzOverflow="overflow" vert="horz" wrap="square" lIns="91440" tIns="45720" rIns="91440" bIns="45720" numCol="1" spcCol="0" rtlCol="0" fromWordArt="0" anchor="ctr" anchorCtr="0" forceAA="0" compatLnSpc="1">
+              <a:prstTxWarp prst="textNoShape">
+                <a:avLst/>
+              </a:prstTxWarp>
+              <a:noAutofit/>
+            </a:bodyPr>
+            <a:lstStyle/>
+            <a:p>
+              <a:endParaRPr lang="en-US" sz="1200" b="1" dirty="0">
+                <a:solidFill>
+                  <a:schemeClr val="tx1"/>
+                </a:solidFill>
+                <a:latin typeface="Times New Roman" panose="02020603050405020304" pitchFamily="18" charset="0"/>
+                <a:cs typeface="Times New Roman" panose="02020603050405020304" pitchFamily="18" charset="0"/>
+              </a:endParaRPr>
+            </a:p>
+            <a:p>
+              <a:r>
+                <a:rPr lang="en-US" sz="1200" b="1" dirty="0">
+                  <a:solidFill>
+                    <a:schemeClr val="tx1"/>
+                  </a:solidFill>
+                  <a:latin typeface="Times New Roman" panose="02020603050405020304" pitchFamily="18" charset="0"/>
+                  <a:cs typeface="Times New Roman" panose="02020603050405020304" pitchFamily="18" charset="0"/>
+                </a:rPr>
+                <a:t>Healthcare Pathway Performance Analysis</a:t>
+              </a:r>
+            </a:p>
+            <a:p>
+              <a:pPr marL="171450" indent="-171450">
+                <a:buFont typeface="Arial" panose="020B0604020202020204" pitchFamily="34" charset="0"/>
+                <a:buChar char="•"/>
+              </a:pPr>
+              <a:r>
+                <a:rPr lang="en-US" sz="1200" dirty="0">
+                  <a:solidFill>
+                    <a:schemeClr val="tx1"/>
+                  </a:solidFill>
+                  <a:latin typeface="Times New Roman" panose="02020603050405020304" pitchFamily="18" charset="0"/>
+                  <a:cs typeface="Times New Roman" panose="02020603050405020304" pitchFamily="18" charset="0"/>
+                </a:rPr>
+                <a:t>Develop machine learning models to identify risk factors</a:t>
+              </a:r>
+            </a:p>
+            <a:p>
+              <a:pPr marL="171450" indent="-171450">
+                <a:buFont typeface="Arial" panose="020B0604020202020204" pitchFamily="34" charset="0"/>
+                <a:buChar char="•"/>
+              </a:pPr>
+              <a:r>
+                <a:rPr lang="en-US" sz="1200" dirty="0">
+                  <a:solidFill>
+                    <a:schemeClr val="tx1"/>
+                  </a:solidFill>
+                  <a:latin typeface="Times New Roman" panose="02020603050405020304" pitchFamily="18" charset="0"/>
+                  <a:cs typeface="Times New Roman" panose="02020603050405020304" pitchFamily="18" charset="0"/>
+                </a:rPr>
+                <a:t>Identify possible means of improving pathway performance</a:t>
+              </a:r>
+            </a:p>
+            <a:p>
+              <a:endParaRPr lang="en-US" sz="1200" dirty="0">
+                <a:solidFill>
+                  <a:schemeClr val="tx1"/>
+                </a:solidFill>
+                <a:latin typeface="Times New Roman" panose="02020603050405020304" pitchFamily="18" charset="0"/>
+                <a:cs typeface="Times New Roman" panose="02020603050405020304" pitchFamily="18" charset="0"/>
+              </a:endParaRPr>
+            </a:p>
+          </p:txBody>
+        </p:sp>
+      </p:grpSp>
+      <p:cxnSp>
+        <p:nvCxnSpPr>
+          <p:cNvPr id="15" name="Straight Arrow Connector 14">
+            <a:extLst>
+              <a:ext uri="{FF2B5EF4-FFF2-40B4-BE49-F238E27FC236}">
+                <a16:creationId xmlns:a16="http://schemas.microsoft.com/office/drawing/2014/main" id="{25E8A3A7-2052-4BD9-8146-F9BB5BCB5635}"/>
+              </a:ext>
+            </a:extLst>
+          </p:cNvPr>
+          <p:cNvCxnSpPr>
+            <a:cxnSpLocks/>
+          </p:cNvCxnSpPr>
+          <p:nvPr/>
+        </p:nvCxnSpPr>
+        <p:spPr>
+          <a:xfrm flipH="1">
+            <a:off x="5886459" y="1139421"/>
+            <a:ext cx="93" cy="182880"/>
+          </a:xfrm>
+          <a:prstGeom prst="straightConnector1">
+            <a:avLst/>
+          </a:prstGeom>
+          <a:ln w="34925">
+            <a:solidFill>
+              <a:schemeClr val="tx1"/>
+            </a:solidFill>
+            <a:tailEnd type="triangle"/>
+          </a:ln>
+        </p:spPr>
+        <p:style>
+          <a:lnRef idx="1">
+            <a:schemeClr val="accent1"/>
+          </a:lnRef>
+          <a:fillRef idx="0">
+            <a:schemeClr val="accent1"/>
+          </a:fillRef>
+          <a:effectRef idx="0">
+            <a:schemeClr val="accent1"/>
+          </a:effectRef>
+          <a:fontRef idx="minor">
+            <a:schemeClr val="tx1"/>
+          </a:fontRef>
+        </p:style>
+      </p:cxnSp>
+      <p:cxnSp>
+        <p:nvCxnSpPr>
+          <p:cNvPr id="17" name="Straight Arrow Connector 16">
+            <a:extLst>
+              <a:ext uri="{FF2B5EF4-FFF2-40B4-BE49-F238E27FC236}">
+                <a16:creationId xmlns:a16="http://schemas.microsoft.com/office/drawing/2014/main" id="{4EA303BB-3825-4AED-8647-AF53A8153DE5}"/>
+              </a:ext>
+            </a:extLst>
+          </p:cNvPr>
+          <p:cNvCxnSpPr>
+            <a:cxnSpLocks/>
+          </p:cNvCxnSpPr>
+          <p:nvPr/>
+        </p:nvCxnSpPr>
+        <p:spPr>
+          <a:xfrm flipH="1">
+            <a:off x="5886459" y="2009293"/>
+            <a:ext cx="93" cy="182880"/>
+          </a:xfrm>
+          <a:prstGeom prst="straightConnector1">
+            <a:avLst/>
+          </a:prstGeom>
+          <a:ln w="34925">
+            <a:solidFill>
+              <a:schemeClr val="tx1"/>
+            </a:solidFill>
+            <a:tailEnd type="triangle"/>
+          </a:ln>
+        </p:spPr>
+        <p:style>
+          <a:lnRef idx="1">
+            <a:schemeClr val="accent1"/>
+          </a:lnRef>
+          <a:fillRef idx="0">
+            <a:schemeClr val="accent1"/>
+          </a:fillRef>
+          <a:effectRef idx="0">
+            <a:schemeClr val="accent1"/>
+          </a:effectRef>
+          <a:fontRef idx="minor">
+            <a:schemeClr val="tx1"/>
+          </a:fontRef>
+        </p:style>
+      </p:cxnSp>
+      <p:cxnSp>
+        <p:nvCxnSpPr>
+          <p:cNvPr id="18" name="Straight Arrow Connector 17">
+            <a:extLst>
+              <a:ext uri="{FF2B5EF4-FFF2-40B4-BE49-F238E27FC236}">
+                <a16:creationId xmlns:a16="http://schemas.microsoft.com/office/drawing/2014/main" id="{79645262-FDAA-4906-B479-413D5D03998B}"/>
+              </a:ext>
+            </a:extLst>
+          </p:cNvPr>
+          <p:cNvCxnSpPr>
+            <a:cxnSpLocks/>
+          </p:cNvCxnSpPr>
+          <p:nvPr/>
+        </p:nvCxnSpPr>
+        <p:spPr>
+          <a:xfrm flipH="1">
+            <a:off x="5886273" y="2924757"/>
+            <a:ext cx="93" cy="182880"/>
+          </a:xfrm>
+          <a:prstGeom prst="straightConnector1">
+            <a:avLst/>
+          </a:prstGeom>
+          <a:ln w="34925">
+            <a:solidFill>
+              <a:schemeClr val="tx1"/>
+            </a:solidFill>
+            <a:tailEnd type="triangle"/>
+          </a:ln>
+        </p:spPr>
+        <p:style>
+          <a:lnRef idx="1">
+            <a:schemeClr val="accent1"/>
+          </a:lnRef>
+          <a:fillRef idx="0">
+            <a:schemeClr val="accent1"/>
+          </a:fillRef>
+          <a:effectRef idx="0">
+            <a:schemeClr val="accent1"/>
+          </a:effectRef>
+          <a:fontRef idx="minor">
+            <a:schemeClr val="tx1"/>
+          </a:fontRef>
+        </p:style>
+      </p:cxnSp>
+      <p:cxnSp>
+        <p:nvCxnSpPr>
+          <p:cNvPr id="19" name="Straight Arrow Connector 18">
+            <a:extLst>
+              <a:ext uri="{FF2B5EF4-FFF2-40B4-BE49-F238E27FC236}">
+                <a16:creationId xmlns:a16="http://schemas.microsoft.com/office/drawing/2014/main" id="{CBA98366-349F-4AE6-A972-0684547CE643}"/>
+              </a:ext>
+            </a:extLst>
+          </p:cNvPr>
+          <p:cNvCxnSpPr>
+            <a:cxnSpLocks/>
+          </p:cNvCxnSpPr>
+          <p:nvPr/>
+        </p:nvCxnSpPr>
+        <p:spPr>
+          <a:xfrm flipH="1">
+            <a:off x="5886366" y="3816628"/>
+            <a:ext cx="93" cy="182880"/>
+          </a:xfrm>
+          <a:prstGeom prst="straightConnector1">
+            <a:avLst/>
+          </a:prstGeom>
+          <a:ln w="34925">
+            <a:solidFill>
+              <a:schemeClr val="tx1"/>
+            </a:solidFill>
+            <a:tailEnd type="triangle"/>
+          </a:ln>
+        </p:spPr>
+        <p:style>
+          <a:lnRef idx="1">
+            <a:schemeClr val="accent1"/>
+          </a:lnRef>
+          <a:fillRef idx="0">
+            <a:schemeClr val="accent1"/>
+          </a:fillRef>
+          <a:effectRef idx="0">
+            <a:schemeClr val="accent1"/>
+          </a:effectRef>
+          <a:fontRef idx="minor">
+            <a:schemeClr val="tx1"/>
+          </a:fontRef>
+        </p:style>
+      </p:cxnSp>
+      <p:grpSp>
+        <p:nvGrpSpPr>
+          <p:cNvPr id="20" name="Group 19">
+            <a:extLst>
+              <a:ext uri="{FF2B5EF4-FFF2-40B4-BE49-F238E27FC236}">
+                <a16:creationId xmlns:a16="http://schemas.microsoft.com/office/drawing/2014/main" id="{F495E13A-0A2A-4D04-A995-9E33FCF26E80}"/>
+              </a:ext>
+            </a:extLst>
+          </p:cNvPr>
+          <p:cNvGrpSpPr/>
+          <p:nvPr/>
+        </p:nvGrpSpPr>
+        <p:grpSpPr>
+          <a:xfrm>
+            <a:off x="9073897" y="787446"/>
+            <a:ext cx="197863" cy="808272"/>
+            <a:chOff x="9145458" y="774723"/>
+            <a:chExt cx="453225" cy="1125996"/>
+          </a:xfrm>
+        </p:grpSpPr>
+        <p:cxnSp>
+          <p:nvCxnSpPr>
+            <p:cNvPr id="21" name="Straight Arrow Connector 20">
+              <a:extLst>
+                <a:ext uri="{FF2B5EF4-FFF2-40B4-BE49-F238E27FC236}">
+                  <a16:creationId xmlns:a16="http://schemas.microsoft.com/office/drawing/2014/main" id="{843D7AD3-9B22-470C-AF1F-12EA0A973E2B}"/>
+                </a:ext>
+              </a:extLst>
+            </p:cNvPr>
+            <p:cNvCxnSpPr>
+              <a:cxnSpLocks/>
+            </p:cNvCxnSpPr>
+            <p:nvPr/>
+          </p:nvCxnSpPr>
+          <p:spPr>
+            <a:xfrm flipH="1">
+              <a:off x="9145458" y="774723"/>
+              <a:ext cx="453225" cy="0"/>
+            </a:xfrm>
+            <a:prstGeom prst="straightConnector1">
+              <a:avLst/>
+            </a:prstGeom>
+            <a:ln w="34925">
+              <a:solidFill>
+                <a:schemeClr val="tx1"/>
+              </a:solidFill>
+              <a:tailEnd type="triangle"/>
+            </a:ln>
+          </p:spPr>
+          <p:style>
+            <a:lnRef idx="1">
+              <a:schemeClr val="accent1"/>
+            </a:lnRef>
+            <a:fillRef idx="0">
+              <a:schemeClr val="accent1"/>
+            </a:fillRef>
+            <a:effectRef idx="0">
+              <a:schemeClr val="accent1"/>
+            </a:effectRef>
+            <a:fontRef idx="minor">
+              <a:schemeClr val="tx1"/>
+            </a:fontRef>
+          </p:style>
+        </p:cxnSp>
+        <p:cxnSp>
+          <p:nvCxnSpPr>
+            <p:cNvPr id="22" name="Straight Connector 21">
+              <a:extLst>
+                <a:ext uri="{FF2B5EF4-FFF2-40B4-BE49-F238E27FC236}">
+                  <a16:creationId xmlns:a16="http://schemas.microsoft.com/office/drawing/2014/main" id="{D765C344-E0B5-4E49-B93E-52E922DA59A4}"/>
+                </a:ext>
+              </a:extLst>
+            </p:cNvPr>
+            <p:cNvCxnSpPr>
+              <a:cxnSpLocks/>
+            </p:cNvCxnSpPr>
+            <p:nvPr/>
+          </p:nvCxnSpPr>
+          <p:spPr>
+            <a:xfrm>
+              <a:off x="9581322" y="774723"/>
+              <a:ext cx="0" cy="1125996"/>
+            </a:xfrm>
+            <a:prstGeom prst="line">
+              <a:avLst/>
+            </a:prstGeom>
+            <a:ln w="34925">
+              <a:solidFill>
+                <a:schemeClr val="tx1"/>
+              </a:solidFill>
+            </a:ln>
+          </p:spPr>
+          <p:style>
+            <a:lnRef idx="1">
+              <a:schemeClr val="accent1"/>
+            </a:lnRef>
+            <a:fillRef idx="0">
+              <a:schemeClr val="accent1"/>
+            </a:fillRef>
+            <a:effectRef idx="0">
+              <a:schemeClr val="accent1"/>
+            </a:effectRef>
+            <a:fontRef idx="minor">
+              <a:schemeClr val="tx1"/>
+            </a:fontRef>
+          </p:style>
+        </p:cxnSp>
+        <p:cxnSp>
+          <p:nvCxnSpPr>
+            <p:cNvPr id="23" name="Straight Connector 22">
+              <a:extLst>
+                <a:ext uri="{FF2B5EF4-FFF2-40B4-BE49-F238E27FC236}">
+                  <a16:creationId xmlns:a16="http://schemas.microsoft.com/office/drawing/2014/main" id="{6CE9C276-C328-44C3-B286-B62DCA3D6E65}"/>
+                </a:ext>
+              </a:extLst>
+            </p:cNvPr>
+            <p:cNvCxnSpPr/>
+            <p:nvPr/>
+          </p:nvCxnSpPr>
+          <p:spPr>
+            <a:xfrm>
+              <a:off x="9232299" y="1900719"/>
+              <a:ext cx="365760" cy="0"/>
+            </a:xfrm>
+            <a:prstGeom prst="line">
+              <a:avLst/>
+            </a:prstGeom>
+            <a:ln w="34925">
+              <a:solidFill>
+                <a:schemeClr val="tx1"/>
+              </a:solidFill>
+            </a:ln>
+          </p:spPr>
+          <p:style>
+            <a:lnRef idx="1">
+              <a:schemeClr val="accent1"/>
+            </a:lnRef>
+            <a:fillRef idx="0">
+              <a:schemeClr val="accent1"/>
+            </a:fillRef>
+            <a:effectRef idx="0">
+              <a:schemeClr val="accent1"/>
+            </a:effectRef>
+            <a:fontRef idx="minor">
+              <a:schemeClr val="tx1"/>
+            </a:fontRef>
+          </p:style>
+        </p:cxnSp>
+      </p:grpSp>
+      <p:grpSp>
+        <p:nvGrpSpPr>
+          <p:cNvPr id="28" name="Group 27">
+            <a:extLst>
+              <a:ext uri="{FF2B5EF4-FFF2-40B4-BE49-F238E27FC236}">
+                <a16:creationId xmlns:a16="http://schemas.microsoft.com/office/drawing/2014/main" id="{6CEE7E74-6CCC-EA41-8224-9B2B90FCE88E}"/>
+              </a:ext>
+            </a:extLst>
+          </p:cNvPr>
+          <p:cNvGrpSpPr/>
+          <p:nvPr/>
+        </p:nvGrpSpPr>
+        <p:grpSpPr>
+          <a:xfrm>
+            <a:off x="9073897" y="1739153"/>
+            <a:ext cx="197591" cy="801153"/>
+            <a:chOff x="9145458" y="774723"/>
+            <a:chExt cx="453225" cy="1125996"/>
+          </a:xfrm>
+        </p:grpSpPr>
+        <p:cxnSp>
+          <p:nvCxnSpPr>
+            <p:cNvPr id="29" name="Straight Arrow Connector 28">
+              <a:extLst>
+                <a:ext uri="{FF2B5EF4-FFF2-40B4-BE49-F238E27FC236}">
+                  <a16:creationId xmlns:a16="http://schemas.microsoft.com/office/drawing/2014/main" id="{B0DA3318-5FB9-1D45-ACA4-8C2941B04868}"/>
+                </a:ext>
+              </a:extLst>
+            </p:cNvPr>
+            <p:cNvCxnSpPr>
+              <a:cxnSpLocks/>
+            </p:cNvCxnSpPr>
+            <p:nvPr/>
+          </p:nvCxnSpPr>
+          <p:spPr>
+            <a:xfrm flipH="1">
+              <a:off x="9145458" y="774723"/>
+              <a:ext cx="453225" cy="0"/>
+            </a:xfrm>
+            <a:prstGeom prst="straightConnector1">
+              <a:avLst/>
+            </a:prstGeom>
+            <a:ln w="34925">
+              <a:solidFill>
+                <a:schemeClr val="tx1"/>
+              </a:solidFill>
+              <a:tailEnd type="triangle"/>
+            </a:ln>
+          </p:spPr>
+          <p:style>
+            <a:lnRef idx="1">
+              <a:schemeClr val="accent1"/>
+            </a:lnRef>
+            <a:fillRef idx="0">
+              <a:schemeClr val="accent1"/>
+            </a:fillRef>
+            <a:effectRef idx="0">
+              <a:schemeClr val="accent1"/>
+            </a:effectRef>
+            <a:fontRef idx="minor">
+              <a:schemeClr val="tx1"/>
+            </a:fontRef>
+          </p:style>
+        </p:cxnSp>
+        <p:cxnSp>
+          <p:nvCxnSpPr>
+            <p:cNvPr id="30" name="Straight Connector 29">
+              <a:extLst>
+                <a:ext uri="{FF2B5EF4-FFF2-40B4-BE49-F238E27FC236}">
+                  <a16:creationId xmlns:a16="http://schemas.microsoft.com/office/drawing/2014/main" id="{6E43E716-83C5-374A-9BC8-4642266BA7C1}"/>
+                </a:ext>
+              </a:extLst>
+            </p:cNvPr>
+            <p:cNvCxnSpPr>
+              <a:cxnSpLocks/>
+            </p:cNvCxnSpPr>
+            <p:nvPr/>
+          </p:nvCxnSpPr>
+          <p:spPr>
+            <a:xfrm>
+              <a:off x="9581322" y="774723"/>
+              <a:ext cx="0" cy="1125996"/>
+            </a:xfrm>
+            <a:prstGeom prst="line">
+              <a:avLst/>
+            </a:prstGeom>
+            <a:ln w="34925">
+              <a:solidFill>
+                <a:schemeClr val="tx1"/>
+              </a:solidFill>
+            </a:ln>
+          </p:spPr>
+          <p:style>
+            <a:lnRef idx="1">
+              <a:schemeClr val="accent1"/>
+            </a:lnRef>
+            <a:fillRef idx="0">
+              <a:schemeClr val="accent1"/>
+            </a:fillRef>
+            <a:effectRef idx="0">
+              <a:schemeClr val="accent1"/>
+            </a:effectRef>
+            <a:fontRef idx="minor">
+              <a:schemeClr val="tx1"/>
+            </a:fontRef>
+          </p:style>
+        </p:cxnSp>
+        <p:cxnSp>
+          <p:nvCxnSpPr>
+            <p:cNvPr id="31" name="Straight Connector 30">
+              <a:extLst>
+                <a:ext uri="{FF2B5EF4-FFF2-40B4-BE49-F238E27FC236}">
+                  <a16:creationId xmlns:a16="http://schemas.microsoft.com/office/drawing/2014/main" id="{92EBA1FB-1C9D-414B-ACE3-71E76FC83A6A}"/>
+                </a:ext>
+              </a:extLst>
+            </p:cNvPr>
+            <p:cNvCxnSpPr/>
+            <p:nvPr/>
+          </p:nvCxnSpPr>
+          <p:spPr>
+            <a:xfrm>
+              <a:off x="9232299" y="1900719"/>
+              <a:ext cx="365760" cy="0"/>
+            </a:xfrm>
+            <a:prstGeom prst="line">
+              <a:avLst/>
+            </a:prstGeom>
+            <a:ln w="34925">
+              <a:solidFill>
+                <a:schemeClr val="tx1"/>
+              </a:solidFill>
+            </a:ln>
+          </p:spPr>
+          <p:style>
+            <a:lnRef idx="1">
+              <a:schemeClr val="accent1"/>
+            </a:lnRef>
+            <a:fillRef idx="0">
+              <a:schemeClr val="accent1"/>
+            </a:fillRef>
+            <a:effectRef idx="0">
+              <a:schemeClr val="accent1"/>
+            </a:effectRef>
+            <a:fontRef idx="minor">
+              <a:schemeClr val="tx1"/>
+            </a:fontRef>
+          </p:style>
+        </p:cxnSp>
+      </p:grpSp>
+    </p:spTree>
+    <p:extLst>
+      <p:ext uri="{BB962C8B-B14F-4D97-AF65-F5344CB8AC3E}">
+        <p14:creationId xmlns:p14="http://schemas.microsoft.com/office/powerpoint/2010/main" val="3704050341"/>
+      </p:ext>
+    </p:extLst>
+  </p:cSld>
+  <p:clrMapOvr>
+    <a:masterClrMapping/>
+  </p:clrMapOvr>
+</p:sld>
+</file>
+
 <file path=ppt/theme/theme1.xml><?xml version="1.0" encoding="utf-8"?>
 <a:theme xmlns:a="http://schemas.openxmlformats.org/drawingml/2006/main" name="Office Theme">
   <a:themeElements>

</xml_diff>